<commit_message>
modified presentation, added pdf
</commit_message>
<xml_diff>
--- a/praesentation/pse-abschluss.pptx
+++ b/praesentation/pse-abschluss.pptx
@@ -5,10 +5,10 @@
     <p:sldMasterId id="2147483676" r:id="rId1"/>
   </p:sldMasterIdLst>
   <p:notesMasterIdLst>
-    <p:notesMasterId r:id="rId15"/>
+    <p:notesMasterId r:id="rId21"/>
   </p:notesMasterIdLst>
   <p:handoutMasterIdLst>
-    <p:handoutMasterId r:id="rId16"/>
+    <p:handoutMasterId r:id="rId22"/>
   </p:handoutMasterIdLst>
   <p:sldIdLst>
     <p:sldId id="285" r:id="rId2"/>
@@ -23,7 +23,13 @@
     <p:sldId id="277" r:id="rId11"/>
     <p:sldId id="272" r:id="rId12"/>
     <p:sldId id="273" r:id="rId13"/>
-    <p:sldId id="270" r:id="rId14"/>
+    <p:sldId id="286" r:id="rId14"/>
+    <p:sldId id="287" r:id="rId15"/>
+    <p:sldId id="289" r:id="rId16"/>
+    <p:sldId id="290" r:id="rId17"/>
+    <p:sldId id="291" r:id="rId18"/>
+    <p:sldId id="292" r:id="rId19"/>
+    <p:sldId id="270" r:id="rId20"/>
   </p:sldIdLst>
   <p:sldSz cx="9144000" cy="6858000" type="screen4x3"/>
   <p:notesSz cx="6858000" cy="9144000"/>
@@ -204,14 +210,14 @@
           </a:ln>
           <a:effectLst/>
           <a:extLst>
-            <a:ext uri="{909E8E84-426E-40dd-AFC4-6F175D3DCCD1}">
+            <a:ext uri="{909E8E84-426E-40DD-AFC4-6F175D3DCCD1}">
               <a14:hiddenFill xmlns:a14="http://schemas.microsoft.com/office/drawing/2010/main">
                 <a:solidFill>
                   <a:schemeClr val="accent1"/>
                 </a:solidFill>
               </a14:hiddenFill>
             </a:ext>
-            <a:ext uri="{91240B29-F687-4f45-9708-019B960494DF}">
+            <a:ext uri="{91240B29-F687-4F45-9708-019B960494DF}">
               <a14:hiddenLine xmlns:a14="http://schemas.microsoft.com/office/drawing/2010/main" w="9525">
                 <a:solidFill>
                   <a:schemeClr val="tx1"/>
@@ -221,7 +227,7 @@
                 <a:tailEnd/>
               </a14:hiddenLine>
             </a:ext>
-            <a:ext uri="{AF507438-7753-43e0-B8FC-AC1667EBCBE1}">
+            <a:ext uri="{AF507438-7753-43E0-B8FC-AC1667EBCBE1}">
               <a14:hiddenEffects xmlns:a14="http://schemas.microsoft.com/office/drawing/2010/main">
                 <a:effectLst>
                   <a:outerShdw dist="35921" dir="2700000" algn="ctr" rotWithShape="0">
@@ -272,14 +278,14 @@
           </a:ln>
           <a:effectLst/>
           <a:extLst>
-            <a:ext uri="{909E8E84-426E-40dd-AFC4-6F175D3DCCD1}">
+            <a:ext uri="{909E8E84-426E-40DD-AFC4-6F175D3DCCD1}">
               <a14:hiddenFill xmlns:a14="http://schemas.microsoft.com/office/drawing/2010/main">
                 <a:solidFill>
                   <a:schemeClr val="accent1"/>
                 </a:solidFill>
               </a14:hiddenFill>
             </a:ext>
-            <a:ext uri="{91240B29-F687-4f45-9708-019B960494DF}">
+            <a:ext uri="{91240B29-F687-4F45-9708-019B960494DF}">
               <a14:hiddenLine xmlns:a14="http://schemas.microsoft.com/office/drawing/2010/main" w="9525">
                 <a:solidFill>
                   <a:schemeClr val="tx1"/>
@@ -289,7 +295,7 @@
                 <a:tailEnd/>
               </a14:hiddenLine>
             </a:ext>
-            <a:ext uri="{AF507438-7753-43e0-B8FC-AC1667EBCBE1}">
+            <a:ext uri="{AF507438-7753-43E0-B8FC-AC1667EBCBE1}">
               <a14:hiddenEffects xmlns:a14="http://schemas.microsoft.com/office/drawing/2010/main">
                 <a:effectLst>
                   <a:outerShdw dist="35921" dir="2700000" algn="ctr" rotWithShape="0">
@@ -340,14 +346,14 @@
           </a:ln>
           <a:effectLst/>
           <a:extLst>
-            <a:ext uri="{909E8E84-426E-40dd-AFC4-6F175D3DCCD1}">
+            <a:ext uri="{909E8E84-426E-40DD-AFC4-6F175D3DCCD1}">
               <a14:hiddenFill xmlns:a14="http://schemas.microsoft.com/office/drawing/2010/main">
                 <a:solidFill>
                   <a:schemeClr val="accent1"/>
                 </a:solidFill>
               </a14:hiddenFill>
             </a:ext>
-            <a:ext uri="{91240B29-F687-4f45-9708-019B960494DF}">
+            <a:ext uri="{91240B29-F687-4F45-9708-019B960494DF}">
               <a14:hiddenLine xmlns:a14="http://schemas.microsoft.com/office/drawing/2010/main" w="9525">
                 <a:solidFill>
                   <a:schemeClr val="tx1"/>
@@ -357,7 +363,7 @@
                 <a:tailEnd/>
               </a14:hiddenLine>
             </a:ext>
-            <a:ext uri="{AF507438-7753-43e0-B8FC-AC1667EBCBE1}">
+            <a:ext uri="{AF507438-7753-43E0-B8FC-AC1667EBCBE1}">
               <a14:hiddenEffects xmlns:a14="http://schemas.microsoft.com/office/drawing/2010/main">
                 <a:effectLst>
                   <a:outerShdw dist="35921" dir="2700000" algn="ctr" rotWithShape="0">
@@ -408,14 +414,14 @@
           </a:ln>
           <a:effectLst/>
           <a:extLst>
-            <a:ext uri="{909E8E84-426E-40dd-AFC4-6F175D3DCCD1}">
+            <a:ext uri="{909E8E84-426E-40DD-AFC4-6F175D3DCCD1}">
               <a14:hiddenFill xmlns:a14="http://schemas.microsoft.com/office/drawing/2010/main">
                 <a:solidFill>
                   <a:schemeClr val="accent1"/>
                 </a:solidFill>
               </a14:hiddenFill>
             </a:ext>
-            <a:ext uri="{91240B29-F687-4f45-9708-019B960494DF}">
+            <a:ext uri="{91240B29-F687-4F45-9708-019B960494DF}">
               <a14:hiddenLine xmlns:a14="http://schemas.microsoft.com/office/drawing/2010/main" w="9525">
                 <a:solidFill>
                   <a:schemeClr val="tx1"/>
@@ -425,7 +431,7 @@
                 <a:tailEnd/>
               </a14:hiddenLine>
             </a:ext>
-            <a:ext uri="{AF507438-7753-43e0-B8FC-AC1667EBCBE1}">
+            <a:ext uri="{AF507438-7753-43E0-B8FC-AC1667EBCBE1}">
               <a14:hiddenEffects xmlns:a14="http://schemas.microsoft.com/office/drawing/2010/main">
                 <a:effectLst>
                   <a:outerShdw dist="35921" dir="2700000" algn="ctr" rotWithShape="0">
@@ -517,14 +523,14 @@
           </a:ln>
           <a:effectLst/>
           <a:extLst>
-            <a:ext uri="{909E8E84-426E-40dd-AFC4-6F175D3DCCD1}">
+            <a:ext uri="{909E8E84-426E-40DD-AFC4-6F175D3DCCD1}">
               <a14:hiddenFill xmlns:a14="http://schemas.microsoft.com/office/drawing/2010/main">
                 <a:solidFill>
                   <a:schemeClr val="accent1"/>
                 </a:solidFill>
               </a14:hiddenFill>
             </a:ext>
-            <a:ext uri="{91240B29-F687-4f45-9708-019B960494DF}">
+            <a:ext uri="{91240B29-F687-4F45-9708-019B960494DF}">
               <a14:hiddenLine xmlns:a14="http://schemas.microsoft.com/office/drawing/2010/main" w="9525">
                 <a:solidFill>
                   <a:schemeClr val="tx1"/>
@@ -534,7 +540,7 @@
                 <a:tailEnd/>
               </a14:hiddenLine>
             </a:ext>
-            <a:ext uri="{AF507438-7753-43e0-B8FC-AC1667EBCBE1}">
+            <a:ext uri="{AF507438-7753-43E0-B8FC-AC1667EBCBE1}">
               <a14:hiddenEffects xmlns:a14="http://schemas.microsoft.com/office/drawing/2010/main">
                 <a:effectLst>
                   <a:outerShdw dist="35921" dir="2700000" algn="ctr" rotWithShape="0">
@@ -585,14 +591,14 @@
           </a:ln>
           <a:effectLst/>
           <a:extLst>
-            <a:ext uri="{909E8E84-426E-40dd-AFC4-6F175D3DCCD1}">
+            <a:ext uri="{909E8E84-426E-40DD-AFC4-6F175D3DCCD1}">
               <a14:hiddenFill xmlns:a14="http://schemas.microsoft.com/office/drawing/2010/main">
                 <a:solidFill>
                   <a:schemeClr val="accent1"/>
                 </a:solidFill>
               </a14:hiddenFill>
             </a:ext>
-            <a:ext uri="{91240B29-F687-4f45-9708-019B960494DF}">
+            <a:ext uri="{91240B29-F687-4F45-9708-019B960494DF}">
               <a14:hiddenLine xmlns:a14="http://schemas.microsoft.com/office/drawing/2010/main" w="9525">
                 <a:solidFill>
                   <a:schemeClr val="tx1"/>
@@ -602,7 +608,7 @@
                 <a:tailEnd/>
               </a14:hiddenLine>
             </a:ext>
-            <a:ext uri="{AF507438-7753-43e0-B8FC-AC1667EBCBE1}">
+            <a:ext uri="{AF507438-7753-43E0-B8FC-AC1667EBCBE1}">
               <a14:hiddenEffects xmlns:a14="http://schemas.microsoft.com/office/drawing/2010/main">
                 <a:effectLst>
                   <a:outerShdw dist="35921" dir="2700000" algn="ctr" rotWithShape="0">
@@ -658,7 +664,7 @@
           </a:ln>
           <a:effectLst/>
           <a:extLst>
-            <a:ext uri="{AF507438-7753-43e0-B8FC-AC1667EBCBE1}">
+            <a:ext uri="{AF507438-7753-43E0-B8FC-AC1667EBCBE1}">
               <a14:hiddenEffects xmlns:a14="http://schemas.microsoft.com/office/drawing/2010/main">
                 <a:effectLst>
                   <a:outerShdw dist="35921" dir="2700000" algn="ctr" rotWithShape="0">
@@ -667,7 +673,7 @@
                 </a:effectLst>
               </a14:hiddenEffects>
             </a:ext>
-            <a:ext uri="{53640926-AAD7-44d8-BBD7-CCE9431645EC}">
+            <a:ext uri="{53640926-AAD7-44D8-BBD7-CCE9431645EC}">
               <a14:shadowObscured xmlns:a14="http://schemas.microsoft.com/office/drawing/2010/main" val="1"/>
             </a:ext>
           </a:extLst>
@@ -697,14 +703,14 @@
           </a:ln>
           <a:effectLst/>
           <a:extLst>
-            <a:ext uri="{909E8E84-426E-40dd-AFC4-6F175D3DCCD1}">
+            <a:ext uri="{909E8E84-426E-40DD-AFC4-6F175D3DCCD1}">
               <a14:hiddenFill xmlns:a14="http://schemas.microsoft.com/office/drawing/2010/main">
                 <a:solidFill>
                   <a:schemeClr val="accent1"/>
                 </a:solidFill>
               </a14:hiddenFill>
             </a:ext>
-            <a:ext uri="{91240B29-F687-4f45-9708-019B960494DF}">
+            <a:ext uri="{91240B29-F687-4F45-9708-019B960494DF}">
               <a14:hiddenLine xmlns:a14="http://schemas.microsoft.com/office/drawing/2010/main" w="9525">
                 <a:solidFill>
                   <a:schemeClr val="tx1"/>
@@ -714,7 +720,7 @@
                 <a:tailEnd/>
               </a14:hiddenLine>
             </a:ext>
-            <a:ext uri="{AF507438-7753-43e0-B8FC-AC1667EBCBE1}">
+            <a:ext uri="{AF507438-7753-43E0-B8FC-AC1667EBCBE1}">
               <a14:hiddenEffects xmlns:a14="http://schemas.microsoft.com/office/drawing/2010/main">
                 <a:effectLst>
                   <a:outerShdw dist="35921" dir="2700000" algn="ctr" rotWithShape="0">
@@ -793,14 +799,14 @@
           </a:ln>
           <a:effectLst/>
           <a:extLst>
-            <a:ext uri="{909E8E84-426E-40dd-AFC4-6F175D3DCCD1}">
+            <a:ext uri="{909E8E84-426E-40DD-AFC4-6F175D3DCCD1}">
               <a14:hiddenFill xmlns:a14="http://schemas.microsoft.com/office/drawing/2010/main">
                 <a:solidFill>
                   <a:schemeClr val="accent1"/>
                 </a:solidFill>
               </a14:hiddenFill>
             </a:ext>
-            <a:ext uri="{91240B29-F687-4f45-9708-019B960494DF}">
+            <a:ext uri="{91240B29-F687-4F45-9708-019B960494DF}">
               <a14:hiddenLine xmlns:a14="http://schemas.microsoft.com/office/drawing/2010/main" w="9525">
                 <a:solidFill>
                   <a:schemeClr val="tx1"/>
@@ -810,7 +816,7 @@
                 <a:tailEnd/>
               </a14:hiddenLine>
             </a:ext>
-            <a:ext uri="{AF507438-7753-43e0-B8FC-AC1667EBCBE1}">
+            <a:ext uri="{AF507438-7753-43E0-B8FC-AC1667EBCBE1}">
               <a14:hiddenEffects xmlns:a14="http://schemas.microsoft.com/office/drawing/2010/main">
                 <a:effectLst>
                   <a:outerShdw dist="35921" dir="2700000" algn="ctr" rotWithShape="0">
@@ -861,14 +867,14 @@
           </a:ln>
           <a:effectLst/>
           <a:extLst>
-            <a:ext uri="{909E8E84-426E-40dd-AFC4-6F175D3DCCD1}">
+            <a:ext uri="{909E8E84-426E-40DD-AFC4-6F175D3DCCD1}">
               <a14:hiddenFill xmlns:a14="http://schemas.microsoft.com/office/drawing/2010/main">
                 <a:solidFill>
                   <a:schemeClr val="accent1"/>
                 </a:solidFill>
               </a14:hiddenFill>
             </a:ext>
-            <a:ext uri="{91240B29-F687-4f45-9708-019B960494DF}">
+            <a:ext uri="{91240B29-F687-4F45-9708-019B960494DF}">
               <a14:hiddenLine xmlns:a14="http://schemas.microsoft.com/office/drawing/2010/main" w="9525">
                 <a:solidFill>
                   <a:schemeClr val="tx1"/>
@@ -878,7 +884,7 @@
                 <a:tailEnd/>
               </a14:hiddenLine>
             </a:ext>
-            <a:ext uri="{AF507438-7753-43e0-B8FC-AC1667EBCBE1}">
+            <a:ext uri="{AF507438-7753-43E0-B8FC-AC1667EBCBE1}">
               <a14:hiddenEffects xmlns:a14="http://schemas.microsoft.com/office/drawing/2010/main">
                 <a:effectLst>
                   <a:outerShdw dist="35921" dir="2700000" algn="ctr" rotWithShape="0">
@@ -1467,19 +1473,52 @@
             </a:r>
             <a:r>
               <a:rPr lang="de-DE" baseline="0" dirty="0" smtClean="0"/>
-              <a:t>... </a:t>
-            </a:r>
+              <a:t> erfordert ein geschicktes </a:t>
+            </a:r>
+            <a:r>
+              <a:rPr lang="de-DE" baseline="0" dirty="0" err="1" smtClean="0"/>
+              <a:t>schema</a:t>
+            </a:r>
+            <a:endParaRPr lang="de-DE" baseline="0" dirty="0" smtClean="0"/>
+          </a:p>
+          <a:p>
             <a:r>
               <a:rPr lang="de-DE" baseline="0" dirty="0" smtClean="0"/>
-              <a:t>TODO (Übergang </a:t>
+              <a:t>Überlegung: wenn jeder den </a:t>
             </a:r>
             <a:r>
               <a:rPr lang="de-DE" baseline="0" dirty="0" err="1" smtClean="0"/>
-              <a:t>Crypto</a:t>
-            </a:r>
-            <a:r>
-              <a:rPr lang="de-DE" baseline="0" smtClean="0"/>
-              <a:t>?)</a:t>
+              <a:t>schlüssel</a:t>
+            </a:r>
+            <a:r>
+              <a:rPr lang="de-DE" baseline="0" dirty="0" smtClean="0"/>
+              <a:t> hat, müsste ein neuer </a:t>
+            </a:r>
+            <a:r>
+              <a:rPr lang="de-DE" baseline="0" dirty="0" err="1" smtClean="0"/>
+              <a:t>schlüssel</a:t>
+            </a:r>
+            <a:r>
+              <a:rPr lang="de-DE" baseline="0" dirty="0" smtClean="0"/>
+              <a:t> verteilt werden</a:t>
+            </a:r>
+          </a:p>
+          <a:p>
+            <a:r>
+              <a:rPr lang="de-DE" baseline="0" dirty="0" smtClean="0"/>
+              <a:t>Daher: aufteilen des </a:t>
+            </a:r>
+            <a:r>
+              <a:rPr lang="de-DE" baseline="0" dirty="0" err="1" smtClean="0"/>
+              <a:t>schlüssels</a:t>
+            </a:r>
+            <a:r>
+              <a:rPr lang="de-DE" baseline="0" dirty="0" smtClean="0"/>
+              <a:t>, jeder bekommt nur einen teil =&gt; visuelle </a:t>
+            </a:r>
+            <a:r>
+              <a:rPr lang="de-DE" baseline="0" dirty="0" err="1" smtClean="0"/>
+              <a:t>kryptographie</a:t>
             </a:r>
             <a:endParaRPr lang="de-DE" dirty="0"/>
           </a:p>
@@ -1568,19 +1607,11 @@
           <a:p>
             <a:r>
               <a:rPr lang="de-DE" dirty="0" smtClean="0"/>
-              <a:t>Entwurf</a:t>
-            </a:r>
-            <a:r>
-              <a:rPr lang="de-DE" smtClean="0"/>
-              <a:t>/Rohdaten</a:t>
-            </a:r>
-            <a:r>
-              <a:rPr lang="de-DE" baseline="0" smtClean="0"/>
-              <a:t> </a:t>
+              <a:t>Beispiel: 4</a:t>
             </a:r>
             <a:r>
               <a:rPr lang="de-DE" baseline="0" dirty="0" smtClean="0"/>
-              <a:t>des Schlüssels</a:t>
+              <a:t> teile, die kombiniert werden</a:t>
             </a:r>
             <a:endParaRPr lang="de-DE" dirty="0"/>
           </a:p>
@@ -1604,7 +1635,241 @@
             <a:fld id="{74ACB795-123D-4B41-ABB8-5412373C4490}" type="slidenum">
               <a:rPr lang="en-GB" smtClean="0"/>
               <a:pPr/>
-              <a:t>13</a:t>
+              <a:t>14</a:t>
+            </a:fld>
+            <a:endParaRPr lang="en-GB"/>
+          </a:p>
+        </p:txBody>
+      </p:sp>
+    </p:spTree>
+    <p:extLst>
+      <p:ext uri="{BB962C8B-B14F-4D97-AF65-F5344CB8AC3E}">
+        <p14:creationId xmlns:p14="http://schemas.microsoft.com/office/powerpoint/2010/main" val="2207623601"/>
+      </p:ext>
+    </p:extLst>
+  </p:cSld>
+  <p:clrMapOvr>
+    <a:masterClrMapping/>
+  </p:clrMapOvr>
+</p:notes>
+</file>
+
+<file path=ppt/notesSlides/notesSlide12.xml><?xml version="1.0" encoding="utf-8"?>
+<p:notes xmlns:a="http://schemas.openxmlformats.org/drawingml/2006/main" xmlns:r="http://schemas.openxmlformats.org/officeDocument/2006/relationships" xmlns:p="http://schemas.openxmlformats.org/presentationml/2006/main">
+  <p:cSld>
+    <p:spTree>
+      <p:nvGrpSpPr>
+        <p:cNvPr id="1" name=""/>
+        <p:cNvGrpSpPr/>
+        <p:nvPr/>
+      </p:nvGrpSpPr>
+      <p:grpSpPr>
+        <a:xfrm>
+          <a:off x="0" y="0"/>
+          <a:ext cx="0" cy="0"/>
+          <a:chOff x="0" y="0"/>
+          <a:chExt cx="0" cy="0"/>
+        </a:xfrm>
+      </p:grpSpPr>
+      <p:sp>
+        <p:nvSpPr>
+          <p:cNvPr id="2" name="Folienbildplatzhalter 1"/>
+          <p:cNvSpPr>
+            <a:spLocks noGrp="1" noRot="1" noChangeAspect="1"/>
+          </p:cNvSpPr>
+          <p:nvPr>
+            <p:ph type="sldImg"/>
+          </p:nvPr>
+        </p:nvSpPr>
+        <p:spPr/>
+      </p:sp>
+      <p:sp>
+        <p:nvSpPr>
+          <p:cNvPr id="3" name="Notizenplatzhalter 2"/>
+          <p:cNvSpPr>
+            <a:spLocks noGrp="1"/>
+          </p:cNvSpPr>
+          <p:nvPr>
+            <p:ph type="body" idx="1"/>
+          </p:nvPr>
+        </p:nvSpPr>
+        <p:spPr/>
+        <p:txBody>
+          <a:bodyPr/>
+          <a:lstStyle/>
+          <a:p>
+            <a:r>
+              <a:rPr lang="de-DE" dirty="0" smtClean="0"/>
+              <a:t>zu</a:t>
+            </a:r>
+            <a:r>
+              <a:rPr lang="de-DE" baseline="0" dirty="0" smtClean="0"/>
+              <a:t> wenig teile = keine </a:t>
+            </a:r>
+            <a:r>
+              <a:rPr lang="de-DE" baseline="0" dirty="0" err="1" smtClean="0"/>
+              <a:t>information</a:t>
+            </a:r>
+            <a:r>
+              <a:rPr lang="de-DE" baseline="0" dirty="0" smtClean="0"/>
+              <a:t>. Auch wenn nur ein teil zu wenig.</a:t>
+            </a:r>
+          </a:p>
+          <a:p>
+            <a:r>
+              <a:rPr lang="de-DE" baseline="0" dirty="0" smtClean="0"/>
+              <a:t>Übertragen auf unser </a:t>
+            </a:r>
+            <a:r>
+              <a:rPr lang="de-DE" baseline="0" dirty="0" err="1" smtClean="0"/>
+              <a:t>verteilungsproblem</a:t>
+            </a:r>
+            <a:r>
+              <a:rPr lang="de-DE" baseline="0" dirty="0" smtClean="0"/>
+              <a:t>: jeder ein teil, es werden 3 andere teile mit den verschlüsselten </a:t>
+            </a:r>
+            <a:r>
+              <a:rPr lang="de-DE" baseline="0" dirty="0" err="1" smtClean="0"/>
+              <a:t>daten</a:t>
+            </a:r>
+            <a:r>
+              <a:rPr lang="de-DE" baseline="0" dirty="0" smtClean="0"/>
+              <a:t> verschickt.</a:t>
+            </a:r>
+          </a:p>
+          <a:p>
+            <a:r>
+              <a:rPr lang="de-DE" baseline="0" dirty="0" smtClean="0"/>
+              <a:t>Ausschließen von Teil 1: eines der „3 anderen Teile“ durch </a:t>
+            </a:r>
+            <a:r>
+              <a:rPr lang="de-DE" baseline="0" smtClean="0"/>
+              <a:t>Teil ersetzen</a:t>
+            </a:r>
+            <a:endParaRPr lang="de-DE" dirty="0"/>
+          </a:p>
+        </p:txBody>
+      </p:sp>
+      <p:sp>
+        <p:nvSpPr>
+          <p:cNvPr id="4" name="Foliennummernplatzhalter 3"/>
+          <p:cNvSpPr>
+            <a:spLocks noGrp="1"/>
+          </p:cNvSpPr>
+          <p:nvPr>
+            <p:ph type="sldNum" sz="quarter" idx="10"/>
+          </p:nvPr>
+        </p:nvSpPr>
+        <p:spPr/>
+        <p:txBody>
+          <a:bodyPr/>
+          <a:lstStyle/>
+          <a:p>
+            <a:fld id="{74ACB795-123D-4B41-ABB8-5412373C4490}" type="slidenum">
+              <a:rPr lang="en-GB" smtClean="0"/>
+              <a:pPr/>
+              <a:t>17</a:t>
+            </a:fld>
+            <a:endParaRPr lang="en-GB"/>
+          </a:p>
+        </p:txBody>
+      </p:sp>
+    </p:spTree>
+    <p:extLst>
+      <p:ext uri="{BB962C8B-B14F-4D97-AF65-F5344CB8AC3E}">
+        <p14:creationId xmlns:p14="http://schemas.microsoft.com/office/powerpoint/2010/main" val="3835148915"/>
+      </p:ext>
+    </p:extLst>
+  </p:cSld>
+  <p:clrMapOvr>
+    <a:masterClrMapping/>
+  </p:clrMapOvr>
+</p:notes>
+</file>
+
+<file path=ppt/notesSlides/notesSlide13.xml><?xml version="1.0" encoding="utf-8"?>
+<p:notes xmlns:a="http://schemas.openxmlformats.org/drawingml/2006/main" xmlns:r="http://schemas.openxmlformats.org/officeDocument/2006/relationships" xmlns:p="http://schemas.openxmlformats.org/presentationml/2006/main">
+  <p:cSld>
+    <p:spTree>
+      <p:nvGrpSpPr>
+        <p:cNvPr id="1" name=""/>
+        <p:cNvGrpSpPr/>
+        <p:nvPr/>
+      </p:nvGrpSpPr>
+      <p:grpSpPr>
+        <a:xfrm>
+          <a:off x="0" y="0"/>
+          <a:ext cx="0" cy="0"/>
+          <a:chOff x="0" y="0"/>
+          <a:chExt cx="0" cy="0"/>
+        </a:xfrm>
+      </p:grpSpPr>
+      <p:sp>
+        <p:nvSpPr>
+          <p:cNvPr id="2" name="Folienbildplatzhalter 1"/>
+          <p:cNvSpPr>
+            <a:spLocks noGrp="1" noRot="1" noChangeAspect="1"/>
+          </p:cNvSpPr>
+          <p:nvPr>
+            <p:ph type="sldImg"/>
+          </p:nvPr>
+        </p:nvSpPr>
+        <p:spPr/>
+      </p:sp>
+      <p:sp>
+        <p:nvSpPr>
+          <p:cNvPr id="3" name="Notizenplatzhalter 2"/>
+          <p:cNvSpPr>
+            <a:spLocks noGrp="1"/>
+          </p:cNvSpPr>
+          <p:nvPr>
+            <p:ph type="body" idx="1"/>
+          </p:nvPr>
+        </p:nvSpPr>
+        <p:spPr/>
+        <p:txBody>
+          <a:bodyPr/>
+          <a:lstStyle/>
+          <a:p>
+            <a:r>
+              <a:rPr lang="de-DE" dirty="0" smtClean="0"/>
+              <a:t>Entwurf</a:t>
+            </a:r>
+            <a:r>
+              <a:rPr lang="de-DE" smtClean="0"/>
+              <a:t>/Rohdaten</a:t>
+            </a:r>
+            <a:r>
+              <a:rPr lang="de-DE" baseline="0" smtClean="0"/>
+              <a:t> </a:t>
+            </a:r>
+            <a:r>
+              <a:rPr lang="de-DE" baseline="0" dirty="0" smtClean="0"/>
+              <a:t>des Schlüssels</a:t>
+            </a:r>
+            <a:endParaRPr lang="de-DE" dirty="0"/>
+          </a:p>
+        </p:txBody>
+      </p:sp>
+      <p:sp>
+        <p:nvSpPr>
+          <p:cNvPr id="4" name="Foliennummernplatzhalter 3"/>
+          <p:cNvSpPr>
+            <a:spLocks noGrp="1"/>
+          </p:cNvSpPr>
+          <p:nvPr>
+            <p:ph type="sldNum" sz="quarter" idx="10"/>
+          </p:nvPr>
+        </p:nvSpPr>
+        <p:spPr/>
+        <p:txBody>
+          <a:bodyPr/>
+          <a:lstStyle/>
+          <a:p>
+            <a:fld id="{74ACB795-123D-4B41-ABB8-5412373C4490}" type="slidenum">
+              <a:rPr lang="en-GB" smtClean="0"/>
+              <a:pPr/>
+              <a:t>19</a:t>
             </a:fld>
             <a:endParaRPr lang="en-GB"/>
           </a:p>
@@ -2679,7 +2944,7 @@
           </a:prstGeom>
           <a:noFill/>
           <a:extLst>
-            <a:ext uri="{909E8E84-426E-40dd-AFC4-6F175D3DCCD1}">
+            <a:ext uri="{909E8E84-426E-40DD-AFC4-6F175D3DCCD1}">
               <a14:hiddenFill xmlns:a14="http://schemas.microsoft.com/office/drawing/2010/main">
                 <a:solidFill>
                   <a:srgbClr val="FFFFFF"/>
@@ -2697,7 +2962,7 @@
   <p:timing>
     <p:tnLst>
       <p:par>
-        <p:cTn xmlns:p14="http://schemas.microsoft.com/office/powerpoint/2010/main" id="1" dur="indefinite" restart="never" nodeType="tmRoot"/>
+        <p:cTn id="1" dur="indefinite" restart="never" nodeType="tmRoot"/>
       </p:par>
     </p:tnLst>
   </p:timing>
@@ -3005,7 +3270,7 @@
             <a:ext cx="8389937" cy="649287"/>
           </a:xfrm>
           <a:extLst>
-            <a:ext uri="{909E8E84-426E-40dd-AFC4-6F175D3DCCD1}">
+            <a:ext uri="{909E8E84-426E-40DD-AFC4-6F175D3DCCD1}">
               <a14:hiddenFill xmlns:a14="http://schemas.microsoft.com/office/drawing/2010/main">
                 <a:solidFill>
                   <a:srgbClr val="50AAE6"/>
@@ -3082,7 +3347,7 @@
   <p:timing>
     <p:tnLst>
       <p:par>
-        <p:cTn xmlns:p14="http://schemas.microsoft.com/office/powerpoint/2010/main" id="1" dur="indefinite" restart="never" nodeType="tmRoot"/>
+        <p:cTn id="1" dur="indefinite" restart="never" nodeType="tmRoot"/>
       </p:par>
     </p:tnLst>
   </p:timing>
@@ -3254,7 +3519,7 @@
   <p:timing>
     <p:tnLst>
       <p:par>
-        <p:cTn xmlns:p14="http://schemas.microsoft.com/office/powerpoint/2010/main" id="1" dur="indefinite" restart="never" nodeType="tmRoot"/>
+        <p:cTn id="1" dur="indefinite" restart="never" nodeType="tmRoot"/>
       </p:par>
     </p:tnLst>
   </p:timing>
@@ -3412,7 +3677,7 @@
   <p:timing>
     <p:tnLst>
       <p:par>
-        <p:cTn xmlns:p14="http://schemas.microsoft.com/office/powerpoint/2010/main" id="1" dur="indefinite" restart="never" nodeType="tmRoot"/>
+        <p:cTn id="1" dur="indefinite" restart="never" nodeType="tmRoot"/>
       </p:par>
     </p:tnLst>
   </p:timing>
@@ -4962,7 +5227,7 @@
               <a:pPr>
                 <a:defRPr/>
               </a:pPr>
-              <a:t>10.03.13</a:t>
+              <a:t>15.03.2013</a:t>
             </a:fld>
             <a:endParaRPr lang="de-DE" sz="1000" dirty="0">
               <a:latin typeface="Arial" pitchFamily="34" charset="0"/>
@@ -5082,7 +5347,7 @@
           </a:prstGeom>
           <a:noFill/>
           <a:extLst>
-            <a:ext uri="{909E8E84-426E-40dd-AFC4-6F175D3DCCD1}">
+            <a:ext uri="{909E8E84-426E-40DD-AFC4-6F175D3DCCD1}">
               <a14:hiddenFill xmlns:a14="http://schemas.microsoft.com/office/drawing/2010/main">
                 <a:solidFill>
                   <a:srgbClr val="FFFFFF"/>
@@ -5112,7 +5377,7 @@
   <p:timing>
     <p:tnLst>
       <p:par>
-        <p:cTn xmlns:p14="http://schemas.microsoft.com/office/powerpoint/2010/main" id="1" dur="indefinite" restart="never" nodeType="tmRoot"/>
+        <p:cTn id="1" dur="indefinite" restart="never" nodeType="tmRoot"/>
       </p:par>
     </p:tnLst>
   </p:timing>
@@ -5542,11 +5807,7 @@
           <a:p>
             <a:r>
               <a:rPr lang="de-DE" dirty="0" smtClean="0"/>
-              <a:t>Vorneweg/Anmerkung, </a:t>
-            </a:r>
-            <a:r>
-              <a:rPr lang="de-DE" dirty="0" smtClean="0"/>
-              <a:t>TODO</a:t>
+              <a:t>Vorneweg/Anmerkung, TODO</a:t>
             </a:r>
             <a:endParaRPr lang="de-DE" dirty="0"/>
           </a:p>
@@ -5629,6 +5890,13 @@
   <p:clrMapOvr>
     <a:masterClrMapping/>
   </p:clrMapOvr>
+  <p:timing>
+    <p:tnLst>
+      <p:par>
+        <p:cTn id="1" dur="indefinite" restart="never" nodeType="tmRoot"/>
+      </p:par>
+    </p:tnLst>
+  </p:timing>
 </p:sld>
 </file>
 
@@ -6846,7 +7114,7 @@
   <p:timing>
     <p:tnLst>
       <p:par>
-        <p:cTn xmlns:p14="http://schemas.microsoft.com/office/powerpoint/2010/main" id="1" dur="indefinite" restart="never" nodeType="tmRoot"/>
+        <p:cTn id="1" dur="indefinite" restart="never" nodeType="tmRoot"/>
       </p:par>
     </p:tnLst>
   </p:timing>
@@ -8067,7 +8335,7 @@
   <p:timing>
     <p:tnLst>
       <p:par>
-        <p:cTn xmlns:p14="http://schemas.microsoft.com/office/powerpoint/2010/main" id="1" dur="indefinite" restart="never" nodeType="tmRoot"/>
+        <p:cTn id="1" dur="indefinite" restart="never" nodeType="tmRoot"/>
       </p:par>
     </p:tnLst>
   </p:timing>
@@ -9276,7 +9544,7 @@
   <p:timing>
     <p:tnLst>
       <p:par>
-        <p:cTn xmlns:p14="http://schemas.microsoft.com/office/powerpoint/2010/main" id="1" dur="indefinite" restart="never" nodeType="tmRoot"/>
+        <p:cTn id="1" dur="indefinite" restart="never" nodeType="tmRoot"/>
       </p:par>
     </p:tnLst>
   </p:timing>
@@ -9284,6 +9552,2728 @@
 </file>
 
 <file path=ppt/slides/slide13.xml><?xml version="1.0" encoding="utf-8"?>
+<p:sld xmlns:a="http://schemas.openxmlformats.org/drawingml/2006/main" xmlns:r="http://schemas.openxmlformats.org/officeDocument/2006/relationships" xmlns:p="http://schemas.openxmlformats.org/presentationml/2006/main">
+  <p:cSld>
+    <p:spTree>
+      <p:nvGrpSpPr>
+        <p:cNvPr id="1" name=""/>
+        <p:cNvGrpSpPr/>
+        <p:nvPr/>
+      </p:nvGrpSpPr>
+      <p:grpSpPr>
+        <a:xfrm>
+          <a:off x="0" y="0"/>
+          <a:ext cx="0" cy="0"/>
+          <a:chOff x="0" y="0"/>
+          <a:chExt cx="0" cy="0"/>
+        </a:xfrm>
+      </p:grpSpPr>
+      <p:sp>
+        <p:nvSpPr>
+          <p:cNvPr id="2" name="Titel 1"/>
+          <p:cNvSpPr>
+            <a:spLocks noGrp="1"/>
+          </p:cNvSpPr>
+          <p:nvPr>
+            <p:ph type="title"/>
+          </p:nvPr>
+        </p:nvSpPr>
+        <p:spPr/>
+        <p:txBody>
+          <a:bodyPr/>
+          <a:lstStyle/>
+          <a:p>
+            <a:r>
+              <a:rPr lang="de-DE" dirty="0" smtClean="0"/>
+              <a:t>Visuelle Kryptographie</a:t>
+            </a:r>
+            <a:endParaRPr lang="de-DE" dirty="0"/>
+          </a:p>
+        </p:txBody>
+      </p:sp>
+      <p:sp>
+        <p:nvSpPr>
+          <p:cNvPr id="4" name="Fußzeilenplatzhalter 3"/>
+          <p:cNvSpPr>
+            <a:spLocks noGrp="1"/>
+          </p:cNvSpPr>
+          <p:nvPr>
+            <p:ph type="ftr" sz="quarter" idx="10"/>
+          </p:nvPr>
+        </p:nvSpPr>
+        <p:spPr/>
+        <p:txBody>
+          <a:bodyPr/>
+          <a:lstStyle/>
+          <a:p>
+            <a:r>
+              <a:rPr lang="de-DE" smtClean="0"/>
+              <a:t>Name Vorname: Titel des Vortrags</a:t>
+            </a:r>
+            <a:endParaRPr lang="de-DE"/>
+          </a:p>
+        </p:txBody>
+      </p:sp>
+      <p:pic>
+        <p:nvPicPr>
+          <p:cNvPr id="1026" name="Picture 2" descr="C:\Users\Tobi\Desktop\Daten\Studium\3Semester\PSE 2012\visual_cryptography\Share1.png"/>
+          <p:cNvPicPr>
+            <a:picLocks noChangeAspect="1" noChangeArrowheads="1"/>
+          </p:cNvPicPr>
+          <p:nvPr/>
+        </p:nvPicPr>
+        <p:blipFill>
+          <a:blip r:embed="rId2">
+            <a:extLst>
+              <a:ext uri="{28A0092B-C50C-407E-A947-70E740481C1C}">
+                <a14:useLocalDpi xmlns:a14="http://schemas.microsoft.com/office/drawing/2010/main" val="0"/>
+              </a:ext>
+            </a:extLst>
+          </a:blip>
+          <a:srcRect/>
+          <a:stretch>
+            <a:fillRect/>
+          </a:stretch>
+        </p:blipFill>
+        <p:spPr bwMode="auto">
+          <a:xfrm>
+            <a:off x="1675606" y="1237454"/>
+            <a:ext cx="5792787" cy="4344590"/>
+          </a:xfrm>
+          <a:prstGeom prst="rect">
+            <a:avLst/>
+          </a:prstGeom>
+          <a:noFill/>
+          <a:extLst>
+            <a:ext uri="{909E8E84-426E-40DD-AFC4-6F175D3DCCD1}">
+              <a14:hiddenFill xmlns:a14="http://schemas.microsoft.com/office/drawing/2010/main">
+                <a:solidFill>
+                  <a:srgbClr val="FFFFFF"/>
+                </a:solidFill>
+              </a14:hiddenFill>
+            </a:ext>
+          </a:extLst>
+        </p:spPr>
+      </p:pic>
+    </p:spTree>
+    <p:extLst>
+      <p:ext uri="{BB962C8B-B14F-4D97-AF65-F5344CB8AC3E}">
+        <p14:creationId xmlns:p14="http://schemas.microsoft.com/office/powerpoint/2010/main" val="4142155360"/>
+      </p:ext>
+    </p:extLst>
+  </p:cSld>
+  <p:clrMapOvr>
+    <a:masterClrMapping/>
+  </p:clrMapOvr>
+  <p:timing>
+    <p:tnLst>
+      <p:par>
+        <p:cTn id="1" dur="indefinite" restart="never" nodeType="tmRoot"/>
+      </p:par>
+    </p:tnLst>
+  </p:timing>
+</p:sld>
+</file>
+
+<file path=ppt/slides/slide14.xml><?xml version="1.0" encoding="utf-8"?>
+<p:sld xmlns:a="http://schemas.openxmlformats.org/drawingml/2006/main" xmlns:r="http://schemas.openxmlformats.org/officeDocument/2006/relationships" xmlns:p="http://schemas.openxmlformats.org/presentationml/2006/main">
+  <p:cSld>
+    <p:spTree>
+      <p:nvGrpSpPr>
+        <p:cNvPr id="1" name=""/>
+        <p:cNvGrpSpPr/>
+        <p:nvPr/>
+      </p:nvGrpSpPr>
+      <p:grpSpPr>
+        <a:xfrm>
+          <a:off x="0" y="0"/>
+          <a:ext cx="0" cy="0"/>
+          <a:chOff x="0" y="0"/>
+          <a:chExt cx="0" cy="0"/>
+        </a:xfrm>
+      </p:grpSpPr>
+      <p:sp>
+        <p:nvSpPr>
+          <p:cNvPr id="2" name="Titel 1"/>
+          <p:cNvSpPr>
+            <a:spLocks noGrp="1"/>
+          </p:cNvSpPr>
+          <p:nvPr>
+            <p:ph type="title"/>
+          </p:nvPr>
+        </p:nvSpPr>
+        <p:spPr/>
+        <p:txBody>
+          <a:bodyPr/>
+          <a:lstStyle/>
+          <a:p>
+            <a:endParaRPr lang="de-DE" dirty="0"/>
+          </a:p>
+        </p:txBody>
+      </p:sp>
+      <p:sp>
+        <p:nvSpPr>
+          <p:cNvPr id="4" name="Fußzeilenplatzhalter 3"/>
+          <p:cNvSpPr>
+            <a:spLocks noGrp="1"/>
+          </p:cNvSpPr>
+          <p:nvPr>
+            <p:ph type="ftr" sz="quarter" idx="10"/>
+          </p:nvPr>
+        </p:nvSpPr>
+        <p:spPr/>
+        <p:txBody>
+          <a:bodyPr/>
+          <a:lstStyle/>
+          <a:p>
+            <a:r>
+              <a:rPr lang="de-DE" smtClean="0"/>
+              <a:t>Name Vorname: Titel des Vortrags</a:t>
+            </a:r>
+            <a:endParaRPr lang="de-DE"/>
+          </a:p>
+        </p:txBody>
+      </p:sp>
+      <p:pic>
+        <p:nvPicPr>
+          <p:cNvPr id="2050" name="Picture 2" descr="C:\Users\Tobi\Desktop\Daten\Studium\3Semester\PSE 2012\visual_cryptography\Share1.png"/>
+          <p:cNvPicPr>
+            <a:picLocks noChangeAspect="1" noChangeArrowheads="1"/>
+          </p:cNvPicPr>
+          <p:nvPr/>
+        </p:nvPicPr>
+        <p:blipFill>
+          <a:blip r:embed="rId3">
+            <a:extLst>
+              <a:ext uri="{28A0092B-C50C-407E-A947-70E740481C1C}">
+                <a14:useLocalDpi xmlns:a14="http://schemas.microsoft.com/office/drawing/2010/main" val="0"/>
+              </a:ext>
+            </a:extLst>
+          </a:blip>
+          <a:srcRect/>
+          <a:stretch>
+            <a:fillRect/>
+          </a:stretch>
+        </p:blipFill>
+        <p:spPr bwMode="auto">
+          <a:xfrm>
+            <a:off x="828675" y="1538288"/>
+            <a:ext cx="1905000" cy="1428750"/>
+          </a:xfrm>
+          <a:prstGeom prst="rect">
+            <a:avLst/>
+          </a:prstGeom>
+          <a:noFill/>
+          <a:extLst>
+            <a:ext uri="{909E8E84-426E-40DD-AFC4-6F175D3DCCD1}">
+              <a14:hiddenFill xmlns:a14="http://schemas.microsoft.com/office/drawing/2010/main">
+                <a:solidFill>
+                  <a:srgbClr val="FFFFFF"/>
+                </a:solidFill>
+              </a14:hiddenFill>
+            </a:ext>
+          </a:extLst>
+        </p:spPr>
+      </p:pic>
+      <p:pic>
+        <p:nvPicPr>
+          <p:cNvPr id="2051" name="Picture 3" descr="C:\Users\Tobi\Desktop\Daten\Studium\3Semester\PSE 2012\visual_cryptography\Share2.png"/>
+          <p:cNvPicPr>
+            <a:picLocks noChangeAspect="1" noChangeArrowheads="1"/>
+          </p:cNvPicPr>
+          <p:nvPr/>
+        </p:nvPicPr>
+        <p:blipFill>
+          <a:blip r:embed="rId4">
+            <a:extLst>
+              <a:ext uri="{28A0092B-C50C-407E-A947-70E740481C1C}">
+                <a14:useLocalDpi xmlns:a14="http://schemas.microsoft.com/office/drawing/2010/main" val="0"/>
+              </a:ext>
+            </a:extLst>
+          </a:blip>
+          <a:srcRect/>
+          <a:stretch>
+            <a:fillRect/>
+          </a:stretch>
+        </p:blipFill>
+        <p:spPr bwMode="auto">
+          <a:xfrm>
+            <a:off x="6248400" y="1538288"/>
+            <a:ext cx="1905000" cy="1428750"/>
+          </a:xfrm>
+          <a:prstGeom prst="rect">
+            <a:avLst/>
+          </a:prstGeom>
+          <a:noFill/>
+          <a:ln>
+            <a:solidFill>
+              <a:schemeClr val="tx1"/>
+            </a:solidFill>
+            <a:prstDash val="dash"/>
+          </a:ln>
+          <a:extLst>
+            <a:ext uri="{909E8E84-426E-40DD-AFC4-6F175D3DCCD1}">
+              <a14:hiddenFill xmlns:a14="http://schemas.microsoft.com/office/drawing/2010/main">
+                <a:solidFill>
+                  <a:srgbClr val="FFFFFF"/>
+                </a:solidFill>
+              </a14:hiddenFill>
+            </a:ext>
+          </a:extLst>
+        </p:spPr>
+      </p:pic>
+      <p:pic>
+        <p:nvPicPr>
+          <p:cNvPr id="2052" name="Picture 4" descr="C:\Users\Tobi\Desktop\Daten\Studium\3Semester\PSE 2012\visual_cryptography\Share3.png"/>
+          <p:cNvPicPr>
+            <a:picLocks noChangeAspect="1" noChangeArrowheads="1"/>
+          </p:cNvPicPr>
+          <p:nvPr/>
+        </p:nvPicPr>
+        <p:blipFill>
+          <a:blip r:embed="rId5">
+            <a:extLst>
+              <a:ext uri="{28A0092B-C50C-407E-A947-70E740481C1C}">
+                <a14:useLocalDpi xmlns:a14="http://schemas.microsoft.com/office/drawing/2010/main" val="0"/>
+              </a:ext>
+            </a:extLst>
+          </a:blip>
+          <a:srcRect/>
+          <a:stretch>
+            <a:fillRect/>
+          </a:stretch>
+        </p:blipFill>
+        <p:spPr bwMode="auto">
+          <a:xfrm>
+            <a:off x="828675" y="4114800"/>
+            <a:ext cx="1905000" cy="1428750"/>
+          </a:xfrm>
+          <a:prstGeom prst="rect">
+            <a:avLst/>
+          </a:prstGeom>
+          <a:noFill/>
+          <a:extLst>
+            <a:ext uri="{909E8E84-426E-40DD-AFC4-6F175D3DCCD1}">
+              <a14:hiddenFill xmlns:a14="http://schemas.microsoft.com/office/drawing/2010/main">
+                <a:solidFill>
+                  <a:srgbClr val="FFFFFF"/>
+                </a:solidFill>
+              </a14:hiddenFill>
+            </a:ext>
+          </a:extLst>
+        </p:spPr>
+      </p:pic>
+      <p:pic>
+        <p:nvPicPr>
+          <p:cNvPr id="2053" name="Picture 5" descr="C:\Users\Tobi\Desktop\Daten\Studium\3Semester\PSE 2012\visual_cryptography\Share4.png"/>
+          <p:cNvPicPr>
+            <a:picLocks noChangeAspect="1" noChangeArrowheads="1"/>
+          </p:cNvPicPr>
+          <p:nvPr/>
+        </p:nvPicPr>
+        <p:blipFill>
+          <a:blip r:embed="rId6">
+            <a:extLst>
+              <a:ext uri="{28A0092B-C50C-407E-A947-70E740481C1C}">
+                <a14:useLocalDpi xmlns:a14="http://schemas.microsoft.com/office/drawing/2010/main" val="0"/>
+              </a:ext>
+            </a:extLst>
+          </a:blip>
+          <a:srcRect/>
+          <a:stretch>
+            <a:fillRect/>
+          </a:stretch>
+        </p:blipFill>
+        <p:spPr bwMode="auto">
+          <a:xfrm>
+            <a:off x="6248400" y="4114800"/>
+            <a:ext cx="1905000" cy="1428750"/>
+          </a:xfrm>
+          <a:prstGeom prst="rect">
+            <a:avLst/>
+          </a:prstGeom>
+          <a:noFill/>
+          <a:extLst>
+            <a:ext uri="{909E8E84-426E-40DD-AFC4-6F175D3DCCD1}">
+              <a14:hiddenFill xmlns:a14="http://schemas.microsoft.com/office/drawing/2010/main">
+                <a:solidFill>
+                  <a:srgbClr val="FFFFFF"/>
+                </a:solidFill>
+              </a14:hiddenFill>
+            </a:ext>
+          </a:extLst>
+        </p:spPr>
+      </p:pic>
+      <p:sp>
+        <p:nvSpPr>
+          <p:cNvPr id="5" name="Rechteck 4"/>
+          <p:cNvSpPr/>
+          <p:nvPr/>
+        </p:nvSpPr>
+        <p:spPr>
+          <a:xfrm>
+            <a:off x="6248400" y="1538288"/>
+            <a:ext cx="1905000" cy="1428750"/>
+          </a:xfrm>
+          <a:prstGeom prst="rect">
+            <a:avLst/>
+          </a:prstGeom>
+          <a:noFill/>
+          <a:ln>
+            <a:prstDash val="dash"/>
+          </a:ln>
+        </p:spPr>
+        <p:style>
+          <a:lnRef idx="2">
+            <a:schemeClr val="accent1">
+              <a:shade val="50000"/>
+            </a:schemeClr>
+          </a:lnRef>
+          <a:fillRef idx="1">
+            <a:schemeClr val="accent1"/>
+          </a:fillRef>
+          <a:effectRef idx="0">
+            <a:schemeClr val="accent1"/>
+          </a:effectRef>
+          <a:fontRef idx="minor">
+            <a:schemeClr val="lt1"/>
+          </a:fontRef>
+        </p:style>
+        <p:txBody>
+          <a:bodyPr rtlCol="0" anchor="ctr"/>
+          <a:lstStyle/>
+          <a:p>
+            <a:pPr algn="ctr"/>
+            <a:endParaRPr lang="de-DE"/>
+          </a:p>
+        </p:txBody>
+      </p:sp>
+      <p:sp>
+        <p:nvSpPr>
+          <p:cNvPr id="10" name="Rechteck 9"/>
+          <p:cNvSpPr/>
+          <p:nvPr/>
+        </p:nvSpPr>
+        <p:spPr>
+          <a:xfrm>
+            <a:off x="828675" y="1544555"/>
+            <a:ext cx="1905000" cy="1428750"/>
+          </a:xfrm>
+          <a:prstGeom prst="rect">
+            <a:avLst/>
+          </a:prstGeom>
+          <a:noFill/>
+          <a:ln>
+            <a:prstDash val="dash"/>
+          </a:ln>
+        </p:spPr>
+        <p:style>
+          <a:lnRef idx="2">
+            <a:schemeClr val="accent1">
+              <a:shade val="50000"/>
+            </a:schemeClr>
+          </a:lnRef>
+          <a:fillRef idx="1">
+            <a:schemeClr val="accent1"/>
+          </a:fillRef>
+          <a:effectRef idx="0">
+            <a:schemeClr val="accent1"/>
+          </a:effectRef>
+          <a:fontRef idx="minor">
+            <a:schemeClr val="lt1"/>
+          </a:fontRef>
+        </p:style>
+        <p:txBody>
+          <a:bodyPr rtlCol="0" anchor="ctr"/>
+          <a:lstStyle/>
+          <a:p>
+            <a:pPr algn="ctr"/>
+            <a:endParaRPr lang="de-DE"/>
+          </a:p>
+        </p:txBody>
+      </p:sp>
+      <p:sp>
+        <p:nvSpPr>
+          <p:cNvPr id="11" name="Rechteck 10"/>
+          <p:cNvSpPr/>
+          <p:nvPr/>
+        </p:nvSpPr>
+        <p:spPr>
+          <a:xfrm>
+            <a:off x="6261234" y="4114800"/>
+            <a:ext cx="1905000" cy="1428750"/>
+          </a:xfrm>
+          <a:prstGeom prst="rect">
+            <a:avLst/>
+          </a:prstGeom>
+          <a:noFill/>
+          <a:ln>
+            <a:prstDash val="dash"/>
+          </a:ln>
+        </p:spPr>
+        <p:style>
+          <a:lnRef idx="2">
+            <a:schemeClr val="accent1">
+              <a:shade val="50000"/>
+            </a:schemeClr>
+          </a:lnRef>
+          <a:fillRef idx="1">
+            <a:schemeClr val="accent1"/>
+          </a:fillRef>
+          <a:effectRef idx="0">
+            <a:schemeClr val="accent1"/>
+          </a:effectRef>
+          <a:fontRef idx="minor">
+            <a:schemeClr val="lt1"/>
+          </a:fontRef>
+        </p:style>
+        <p:txBody>
+          <a:bodyPr rtlCol="0" anchor="ctr"/>
+          <a:lstStyle/>
+          <a:p>
+            <a:pPr algn="ctr"/>
+            <a:endParaRPr lang="de-DE"/>
+          </a:p>
+        </p:txBody>
+      </p:sp>
+      <p:sp>
+        <p:nvSpPr>
+          <p:cNvPr id="12" name="Rechteck 11"/>
+          <p:cNvSpPr/>
+          <p:nvPr/>
+        </p:nvSpPr>
+        <p:spPr>
+          <a:xfrm>
+            <a:off x="828675" y="4114800"/>
+            <a:ext cx="1905000" cy="1428750"/>
+          </a:xfrm>
+          <a:prstGeom prst="rect">
+            <a:avLst/>
+          </a:prstGeom>
+          <a:noFill/>
+          <a:ln>
+            <a:prstDash val="dash"/>
+          </a:ln>
+        </p:spPr>
+        <p:style>
+          <a:lnRef idx="2">
+            <a:schemeClr val="accent1">
+              <a:shade val="50000"/>
+            </a:schemeClr>
+          </a:lnRef>
+          <a:fillRef idx="1">
+            <a:schemeClr val="accent1"/>
+          </a:fillRef>
+          <a:effectRef idx="0">
+            <a:schemeClr val="accent1"/>
+          </a:effectRef>
+          <a:fontRef idx="minor">
+            <a:schemeClr val="lt1"/>
+          </a:fontRef>
+        </p:style>
+        <p:txBody>
+          <a:bodyPr rtlCol="0" anchor="ctr"/>
+          <a:lstStyle/>
+          <a:p>
+            <a:pPr algn="ctr"/>
+            <a:endParaRPr lang="de-DE"/>
+          </a:p>
+        </p:txBody>
+      </p:sp>
+    </p:spTree>
+    <p:extLst>
+      <p:ext uri="{BB962C8B-B14F-4D97-AF65-F5344CB8AC3E}">
+        <p14:creationId xmlns:p14="http://schemas.microsoft.com/office/powerpoint/2010/main" val="1318003112"/>
+      </p:ext>
+    </p:extLst>
+  </p:cSld>
+  <p:clrMapOvr>
+    <a:masterClrMapping/>
+  </p:clrMapOvr>
+  <p:timing>
+    <p:tnLst>
+      <p:par>
+        <p:cTn id="1" dur="indefinite" restart="never" nodeType="tmRoot"/>
+      </p:par>
+    </p:tnLst>
+  </p:timing>
+</p:sld>
+</file>
+
+<file path=ppt/slides/slide15.xml><?xml version="1.0" encoding="utf-8"?>
+<p:sld xmlns:a="http://schemas.openxmlformats.org/drawingml/2006/main" xmlns:r="http://schemas.openxmlformats.org/officeDocument/2006/relationships" xmlns:p="http://schemas.openxmlformats.org/presentationml/2006/main">
+  <p:cSld>
+    <p:spTree>
+      <p:nvGrpSpPr>
+        <p:cNvPr id="1" name=""/>
+        <p:cNvGrpSpPr/>
+        <p:nvPr/>
+      </p:nvGrpSpPr>
+      <p:grpSpPr>
+        <a:xfrm>
+          <a:off x="0" y="0"/>
+          <a:ext cx="0" cy="0"/>
+          <a:chOff x="0" y="0"/>
+          <a:chExt cx="0" cy="0"/>
+        </a:xfrm>
+      </p:grpSpPr>
+      <p:pic>
+        <p:nvPicPr>
+          <p:cNvPr id="2051" name="Picture 3" descr="C:\Users\Tobi\Desktop\Daten\Studium\3Semester\PSE 2012\visual_cryptography\Share2.png"/>
+          <p:cNvPicPr>
+            <a:picLocks noChangeAspect="1" noChangeArrowheads="1"/>
+          </p:cNvPicPr>
+          <p:nvPr/>
+        </p:nvPicPr>
+        <p:blipFill>
+          <a:blip r:embed="rId2">
+            <a:extLst>
+              <a:ext uri="{28A0092B-C50C-407E-A947-70E740481C1C}">
+                <a14:useLocalDpi xmlns:a14="http://schemas.microsoft.com/office/drawing/2010/main" val="0"/>
+              </a:ext>
+            </a:extLst>
+          </a:blip>
+          <a:srcRect/>
+          <a:stretch>
+            <a:fillRect/>
+          </a:stretch>
+        </p:blipFill>
+        <p:spPr bwMode="auto">
+          <a:xfrm>
+            <a:off x="3581400" y="2838450"/>
+            <a:ext cx="1905000" cy="1428750"/>
+          </a:xfrm>
+          <a:prstGeom prst="rect">
+            <a:avLst/>
+          </a:prstGeom>
+          <a:noFill/>
+          <a:ln>
+            <a:noFill/>
+            <a:prstDash val="dash"/>
+          </a:ln>
+          <a:extLst>
+            <a:ext uri="{909E8E84-426E-40DD-AFC4-6F175D3DCCD1}">
+              <a14:hiddenFill xmlns:a14="http://schemas.microsoft.com/office/drawing/2010/main">
+                <a:solidFill>
+                  <a:srgbClr val="FFFFFF"/>
+                </a:solidFill>
+              </a14:hiddenFill>
+            </a:ext>
+          </a:extLst>
+        </p:spPr>
+      </p:pic>
+      <p:sp>
+        <p:nvSpPr>
+          <p:cNvPr id="2" name="Titel 1"/>
+          <p:cNvSpPr>
+            <a:spLocks noGrp="1"/>
+          </p:cNvSpPr>
+          <p:nvPr>
+            <p:ph type="title"/>
+          </p:nvPr>
+        </p:nvSpPr>
+        <p:spPr/>
+        <p:txBody>
+          <a:bodyPr/>
+          <a:lstStyle/>
+          <a:p>
+            <a:endParaRPr lang="de-DE"/>
+          </a:p>
+        </p:txBody>
+      </p:sp>
+      <p:sp>
+        <p:nvSpPr>
+          <p:cNvPr id="4" name="Fußzeilenplatzhalter 3"/>
+          <p:cNvSpPr>
+            <a:spLocks noGrp="1"/>
+          </p:cNvSpPr>
+          <p:nvPr>
+            <p:ph type="ftr" sz="quarter" idx="10"/>
+          </p:nvPr>
+        </p:nvSpPr>
+        <p:spPr/>
+        <p:txBody>
+          <a:bodyPr/>
+          <a:lstStyle/>
+          <a:p>
+            <a:r>
+              <a:rPr lang="de-DE" smtClean="0"/>
+              <a:t>Name Vorname: Titel des Vortrags</a:t>
+            </a:r>
+            <a:endParaRPr lang="de-DE"/>
+          </a:p>
+        </p:txBody>
+      </p:sp>
+      <p:pic>
+        <p:nvPicPr>
+          <p:cNvPr id="2050" name="Picture 2" descr="C:\Users\Tobi\Desktop\Daten\Studium\3Semester\PSE 2012\visual_cryptography\Share1.png"/>
+          <p:cNvPicPr>
+            <a:picLocks noChangeAspect="1" noChangeArrowheads="1"/>
+          </p:cNvPicPr>
+          <p:nvPr/>
+        </p:nvPicPr>
+        <p:blipFill>
+          <a:blip r:embed="rId3">
+            <a:extLst>
+              <a:ext uri="{28A0092B-C50C-407E-A947-70E740481C1C}">
+                <a14:useLocalDpi xmlns:a14="http://schemas.microsoft.com/office/drawing/2010/main" val="0"/>
+              </a:ext>
+            </a:extLst>
+          </a:blip>
+          <a:srcRect/>
+          <a:stretch>
+            <a:fillRect/>
+          </a:stretch>
+        </p:blipFill>
+        <p:spPr bwMode="auto">
+          <a:xfrm>
+            <a:off x="828675" y="1538288"/>
+            <a:ext cx="1905000" cy="1428750"/>
+          </a:xfrm>
+          <a:prstGeom prst="rect">
+            <a:avLst/>
+          </a:prstGeom>
+          <a:noFill/>
+          <a:extLst>
+            <a:ext uri="{909E8E84-426E-40DD-AFC4-6F175D3DCCD1}">
+              <a14:hiddenFill xmlns:a14="http://schemas.microsoft.com/office/drawing/2010/main">
+                <a:solidFill>
+                  <a:srgbClr val="FFFFFF"/>
+                </a:solidFill>
+              </a14:hiddenFill>
+            </a:ext>
+          </a:extLst>
+        </p:spPr>
+      </p:pic>
+      <p:pic>
+        <p:nvPicPr>
+          <p:cNvPr id="2052" name="Picture 4" descr="C:\Users\Tobi\Desktop\Daten\Studium\3Semester\PSE 2012\visual_cryptography\Share3.png"/>
+          <p:cNvPicPr>
+            <a:picLocks noChangeAspect="1" noChangeArrowheads="1"/>
+          </p:cNvPicPr>
+          <p:nvPr/>
+        </p:nvPicPr>
+        <p:blipFill>
+          <a:blip r:embed="rId4">
+            <a:extLst>
+              <a:ext uri="{28A0092B-C50C-407E-A947-70E740481C1C}">
+                <a14:useLocalDpi xmlns:a14="http://schemas.microsoft.com/office/drawing/2010/main" val="0"/>
+              </a:ext>
+            </a:extLst>
+          </a:blip>
+          <a:srcRect/>
+          <a:stretch>
+            <a:fillRect/>
+          </a:stretch>
+        </p:blipFill>
+        <p:spPr bwMode="auto">
+          <a:xfrm>
+            <a:off x="828675" y="4114800"/>
+            <a:ext cx="1905000" cy="1428750"/>
+          </a:xfrm>
+          <a:prstGeom prst="rect">
+            <a:avLst/>
+          </a:prstGeom>
+          <a:noFill/>
+          <a:extLst>
+            <a:ext uri="{909E8E84-426E-40DD-AFC4-6F175D3DCCD1}">
+              <a14:hiddenFill xmlns:a14="http://schemas.microsoft.com/office/drawing/2010/main">
+                <a:solidFill>
+                  <a:srgbClr val="FFFFFF"/>
+                </a:solidFill>
+              </a14:hiddenFill>
+            </a:ext>
+          </a:extLst>
+        </p:spPr>
+      </p:pic>
+      <p:pic>
+        <p:nvPicPr>
+          <p:cNvPr id="2053" name="Picture 5" descr="C:\Users\Tobi\Desktop\Daten\Studium\3Semester\PSE 2012\visual_cryptography\Share4.png"/>
+          <p:cNvPicPr>
+            <a:picLocks noChangeAspect="1" noChangeArrowheads="1"/>
+          </p:cNvPicPr>
+          <p:nvPr/>
+        </p:nvPicPr>
+        <p:blipFill>
+          <a:blip r:embed="rId5">
+            <a:extLst>
+              <a:ext uri="{28A0092B-C50C-407E-A947-70E740481C1C}">
+                <a14:useLocalDpi xmlns:a14="http://schemas.microsoft.com/office/drawing/2010/main" val="0"/>
+              </a:ext>
+            </a:extLst>
+          </a:blip>
+          <a:srcRect/>
+          <a:stretch>
+            <a:fillRect/>
+          </a:stretch>
+        </p:blipFill>
+        <p:spPr bwMode="auto">
+          <a:xfrm>
+            <a:off x="6248400" y="4114800"/>
+            <a:ext cx="1905000" cy="1428750"/>
+          </a:xfrm>
+          <a:prstGeom prst="rect">
+            <a:avLst/>
+          </a:prstGeom>
+          <a:noFill/>
+          <a:extLst>
+            <a:ext uri="{909E8E84-426E-40DD-AFC4-6F175D3DCCD1}">
+              <a14:hiddenFill xmlns:a14="http://schemas.microsoft.com/office/drawing/2010/main">
+                <a:solidFill>
+                  <a:srgbClr val="FFFFFF"/>
+                </a:solidFill>
+              </a14:hiddenFill>
+            </a:ext>
+          </a:extLst>
+        </p:spPr>
+      </p:pic>
+      <p:sp>
+        <p:nvSpPr>
+          <p:cNvPr id="5" name="Rechteck 4"/>
+          <p:cNvSpPr/>
+          <p:nvPr/>
+        </p:nvSpPr>
+        <p:spPr>
+          <a:xfrm>
+            <a:off x="6248400" y="1538288"/>
+            <a:ext cx="1905000" cy="1428750"/>
+          </a:xfrm>
+          <a:prstGeom prst="rect">
+            <a:avLst/>
+          </a:prstGeom>
+          <a:noFill/>
+          <a:ln>
+            <a:prstDash val="dash"/>
+          </a:ln>
+        </p:spPr>
+        <p:style>
+          <a:lnRef idx="2">
+            <a:schemeClr val="accent1">
+              <a:shade val="50000"/>
+            </a:schemeClr>
+          </a:lnRef>
+          <a:fillRef idx="1">
+            <a:schemeClr val="accent1"/>
+          </a:fillRef>
+          <a:effectRef idx="0">
+            <a:schemeClr val="accent1"/>
+          </a:effectRef>
+          <a:fontRef idx="minor">
+            <a:schemeClr val="lt1"/>
+          </a:fontRef>
+        </p:style>
+        <p:txBody>
+          <a:bodyPr rtlCol="0" anchor="ctr"/>
+          <a:lstStyle/>
+          <a:p>
+            <a:pPr algn="ctr"/>
+            <a:endParaRPr lang="de-DE"/>
+          </a:p>
+        </p:txBody>
+      </p:sp>
+      <p:sp>
+        <p:nvSpPr>
+          <p:cNvPr id="10" name="Rechteck 9"/>
+          <p:cNvSpPr/>
+          <p:nvPr/>
+        </p:nvSpPr>
+        <p:spPr>
+          <a:xfrm>
+            <a:off x="828675" y="1544555"/>
+            <a:ext cx="1905000" cy="1428750"/>
+          </a:xfrm>
+          <a:prstGeom prst="rect">
+            <a:avLst/>
+          </a:prstGeom>
+          <a:noFill/>
+          <a:ln>
+            <a:prstDash val="dash"/>
+          </a:ln>
+        </p:spPr>
+        <p:style>
+          <a:lnRef idx="2">
+            <a:schemeClr val="accent1">
+              <a:shade val="50000"/>
+            </a:schemeClr>
+          </a:lnRef>
+          <a:fillRef idx="1">
+            <a:schemeClr val="accent1"/>
+          </a:fillRef>
+          <a:effectRef idx="0">
+            <a:schemeClr val="accent1"/>
+          </a:effectRef>
+          <a:fontRef idx="minor">
+            <a:schemeClr val="lt1"/>
+          </a:fontRef>
+        </p:style>
+        <p:txBody>
+          <a:bodyPr rtlCol="0" anchor="ctr"/>
+          <a:lstStyle/>
+          <a:p>
+            <a:pPr algn="ctr"/>
+            <a:endParaRPr lang="de-DE"/>
+          </a:p>
+        </p:txBody>
+      </p:sp>
+      <p:sp>
+        <p:nvSpPr>
+          <p:cNvPr id="11" name="Rechteck 10"/>
+          <p:cNvSpPr/>
+          <p:nvPr/>
+        </p:nvSpPr>
+        <p:spPr>
+          <a:xfrm>
+            <a:off x="6261234" y="4114800"/>
+            <a:ext cx="1905000" cy="1428750"/>
+          </a:xfrm>
+          <a:prstGeom prst="rect">
+            <a:avLst/>
+          </a:prstGeom>
+          <a:noFill/>
+          <a:ln>
+            <a:prstDash val="dash"/>
+          </a:ln>
+        </p:spPr>
+        <p:style>
+          <a:lnRef idx="2">
+            <a:schemeClr val="accent1">
+              <a:shade val="50000"/>
+            </a:schemeClr>
+          </a:lnRef>
+          <a:fillRef idx="1">
+            <a:schemeClr val="accent1"/>
+          </a:fillRef>
+          <a:effectRef idx="0">
+            <a:schemeClr val="accent1"/>
+          </a:effectRef>
+          <a:fontRef idx="minor">
+            <a:schemeClr val="lt1"/>
+          </a:fontRef>
+        </p:style>
+        <p:txBody>
+          <a:bodyPr rtlCol="0" anchor="ctr"/>
+          <a:lstStyle/>
+          <a:p>
+            <a:pPr algn="ctr"/>
+            <a:endParaRPr lang="de-DE"/>
+          </a:p>
+        </p:txBody>
+      </p:sp>
+      <p:sp>
+        <p:nvSpPr>
+          <p:cNvPr id="12" name="Rechteck 11"/>
+          <p:cNvSpPr/>
+          <p:nvPr/>
+        </p:nvSpPr>
+        <p:spPr>
+          <a:xfrm>
+            <a:off x="828675" y="4114800"/>
+            <a:ext cx="1905000" cy="1428750"/>
+          </a:xfrm>
+          <a:prstGeom prst="rect">
+            <a:avLst/>
+          </a:prstGeom>
+          <a:noFill/>
+          <a:ln>
+            <a:prstDash val="dash"/>
+          </a:ln>
+        </p:spPr>
+        <p:style>
+          <a:lnRef idx="2">
+            <a:schemeClr val="accent1">
+              <a:shade val="50000"/>
+            </a:schemeClr>
+          </a:lnRef>
+          <a:fillRef idx="1">
+            <a:schemeClr val="accent1"/>
+          </a:fillRef>
+          <a:effectRef idx="0">
+            <a:schemeClr val="accent1"/>
+          </a:effectRef>
+          <a:fontRef idx="minor">
+            <a:schemeClr val="lt1"/>
+          </a:fontRef>
+        </p:style>
+        <p:txBody>
+          <a:bodyPr rtlCol="0" anchor="ctr"/>
+          <a:lstStyle/>
+          <a:p>
+            <a:pPr algn="ctr"/>
+            <a:endParaRPr lang="de-DE"/>
+          </a:p>
+        </p:txBody>
+      </p:sp>
+      <p:sp>
+        <p:nvSpPr>
+          <p:cNvPr id="13" name="Pfeil nach unten 12"/>
+          <p:cNvSpPr/>
+          <p:nvPr/>
+        </p:nvSpPr>
+        <p:spPr>
+          <a:xfrm rot="3904123">
+            <a:off x="5659717" y="2651713"/>
+            <a:ext cx="361598" cy="568784"/>
+          </a:xfrm>
+          <a:prstGeom prst="downArrow">
+            <a:avLst>
+              <a:gd name="adj1" fmla="val 44533"/>
+              <a:gd name="adj2" fmla="val 50000"/>
+            </a:avLst>
+          </a:prstGeom>
+        </p:spPr>
+        <p:style>
+          <a:lnRef idx="2">
+            <a:schemeClr val="accent1">
+              <a:shade val="50000"/>
+            </a:schemeClr>
+          </a:lnRef>
+          <a:fillRef idx="1">
+            <a:schemeClr val="accent1"/>
+          </a:fillRef>
+          <a:effectRef idx="0">
+            <a:schemeClr val="accent1"/>
+          </a:effectRef>
+          <a:fontRef idx="minor">
+            <a:schemeClr val="lt1"/>
+          </a:fontRef>
+        </p:style>
+        <p:txBody>
+          <a:bodyPr rtlCol="0" anchor="ctr"/>
+          <a:lstStyle/>
+          <a:p>
+            <a:pPr algn="ctr"/>
+            <a:endParaRPr lang="de-DE"/>
+          </a:p>
+        </p:txBody>
+      </p:sp>
+    </p:spTree>
+    <p:extLst>
+      <p:ext uri="{BB962C8B-B14F-4D97-AF65-F5344CB8AC3E}">
+        <p14:creationId xmlns:p14="http://schemas.microsoft.com/office/powerpoint/2010/main" val="3210687876"/>
+      </p:ext>
+    </p:extLst>
+  </p:cSld>
+  <p:clrMapOvr>
+    <a:masterClrMapping/>
+  </p:clrMapOvr>
+  <p:timing>
+    <p:tnLst>
+      <p:par>
+        <p:cTn id="1" dur="indefinite" restart="never" nodeType="tmRoot"/>
+      </p:par>
+    </p:tnLst>
+  </p:timing>
+</p:sld>
+</file>
+
+<file path=ppt/slides/slide16.xml><?xml version="1.0" encoding="utf-8"?>
+<p:sld xmlns:a="http://schemas.openxmlformats.org/drawingml/2006/main" xmlns:r="http://schemas.openxmlformats.org/officeDocument/2006/relationships" xmlns:p="http://schemas.openxmlformats.org/presentationml/2006/main">
+  <p:cSld>
+    <p:spTree>
+      <p:nvGrpSpPr>
+        <p:cNvPr id="1" name=""/>
+        <p:cNvGrpSpPr/>
+        <p:nvPr/>
+      </p:nvGrpSpPr>
+      <p:grpSpPr>
+        <a:xfrm>
+          <a:off x="0" y="0"/>
+          <a:ext cx="0" cy="0"/>
+          <a:chOff x="0" y="0"/>
+          <a:chExt cx="0" cy="0"/>
+        </a:xfrm>
+      </p:grpSpPr>
+      <p:pic>
+        <p:nvPicPr>
+          <p:cNvPr id="2051" name="Picture 3" descr="C:\Users\Tobi\Desktop\Daten\Studium\3Semester\PSE 2012\visual_cryptography\Share2.png"/>
+          <p:cNvPicPr>
+            <a:picLocks noChangeAspect="1" noChangeArrowheads="1"/>
+          </p:cNvPicPr>
+          <p:nvPr/>
+        </p:nvPicPr>
+        <p:blipFill>
+          <a:blip r:embed="rId2">
+            <a:extLst>
+              <a:ext uri="{28A0092B-C50C-407E-A947-70E740481C1C}">
+                <a14:useLocalDpi xmlns:a14="http://schemas.microsoft.com/office/drawing/2010/main" val="0"/>
+              </a:ext>
+            </a:extLst>
+          </a:blip>
+          <a:srcRect/>
+          <a:stretch>
+            <a:fillRect/>
+          </a:stretch>
+        </p:blipFill>
+        <p:spPr bwMode="auto">
+          <a:xfrm>
+            <a:off x="3581400" y="2838450"/>
+            <a:ext cx="1905000" cy="1428750"/>
+          </a:xfrm>
+          <a:prstGeom prst="rect">
+            <a:avLst/>
+          </a:prstGeom>
+          <a:noFill/>
+          <a:ln>
+            <a:noFill/>
+            <a:prstDash val="dash"/>
+          </a:ln>
+          <a:extLst>
+            <a:ext uri="{909E8E84-426E-40DD-AFC4-6F175D3DCCD1}">
+              <a14:hiddenFill xmlns:a14="http://schemas.microsoft.com/office/drawing/2010/main">
+                <a:solidFill>
+                  <a:srgbClr val="FFFFFF"/>
+                </a:solidFill>
+              </a14:hiddenFill>
+            </a:ext>
+          </a:extLst>
+        </p:spPr>
+      </p:pic>
+      <p:sp>
+        <p:nvSpPr>
+          <p:cNvPr id="2" name="Titel 1"/>
+          <p:cNvSpPr>
+            <a:spLocks noGrp="1"/>
+          </p:cNvSpPr>
+          <p:nvPr>
+            <p:ph type="title"/>
+          </p:nvPr>
+        </p:nvSpPr>
+        <p:spPr/>
+        <p:txBody>
+          <a:bodyPr/>
+          <a:lstStyle/>
+          <a:p>
+            <a:endParaRPr lang="de-DE"/>
+          </a:p>
+        </p:txBody>
+      </p:sp>
+      <p:sp>
+        <p:nvSpPr>
+          <p:cNvPr id="4" name="Fußzeilenplatzhalter 3"/>
+          <p:cNvSpPr>
+            <a:spLocks noGrp="1"/>
+          </p:cNvSpPr>
+          <p:nvPr>
+            <p:ph type="ftr" sz="quarter" idx="10"/>
+          </p:nvPr>
+        </p:nvSpPr>
+        <p:spPr/>
+        <p:txBody>
+          <a:bodyPr/>
+          <a:lstStyle/>
+          <a:p>
+            <a:r>
+              <a:rPr lang="de-DE" smtClean="0"/>
+              <a:t>Name Vorname: Titel des Vortrags</a:t>
+            </a:r>
+            <a:endParaRPr lang="de-DE"/>
+          </a:p>
+        </p:txBody>
+      </p:sp>
+      <p:pic>
+        <p:nvPicPr>
+          <p:cNvPr id="2052" name="Picture 4" descr="C:\Users\Tobi\Desktop\Daten\Studium\3Semester\PSE 2012\visual_cryptography\Share3.png"/>
+          <p:cNvPicPr>
+            <a:picLocks noChangeAspect="1" noChangeArrowheads="1"/>
+          </p:cNvPicPr>
+          <p:nvPr/>
+        </p:nvPicPr>
+        <p:blipFill>
+          <a:blip r:embed="rId3">
+            <a:extLst>
+              <a:ext uri="{28A0092B-C50C-407E-A947-70E740481C1C}">
+                <a14:useLocalDpi xmlns:a14="http://schemas.microsoft.com/office/drawing/2010/main" val="0"/>
+              </a:ext>
+            </a:extLst>
+          </a:blip>
+          <a:srcRect/>
+          <a:stretch>
+            <a:fillRect/>
+          </a:stretch>
+        </p:blipFill>
+        <p:spPr bwMode="auto">
+          <a:xfrm>
+            <a:off x="828675" y="4114800"/>
+            <a:ext cx="1905000" cy="1428750"/>
+          </a:xfrm>
+          <a:prstGeom prst="rect">
+            <a:avLst/>
+          </a:prstGeom>
+          <a:noFill/>
+          <a:extLst>
+            <a:ext uri="{909E8E84-426E-40DD-AFC4-6F175D3DCCD1}">
+              <a14:hiddenFill xmlns:a14="http://schemas.microsoft.com/office/drawing/2010/main">
+                <a:solidFill>
+                  <a:srgbClr val="FFFFFF"/>
+                </a:solidFill>
+              </a14:hiddenFill>
+            </a:ext>
+          </a:extLst>
+        </p:spPr>
+      </p:pic>
+      <p:pic>
+        <p:nvPicPr>
+          <p:cNvPr id="2053" name="Picture 5" descr="C:\Users\Tobi\Desktop\Daten\Studium\3Semester\PSE 2012\visual_cryptography\Share4.png"/>
+          <p:cNvPicPr>
+            <a:picLocks noChangeAspect="1" noChangeArrowheads="1"/>
+          </p:cNvPicPr>
+          <p:nvPr/>
+        </p:nvPicPr>
+        <p:blipFill>
+          <a:blip r:embed="rId4">
+            <a:extLst>
+              <a:ext uri="{28A0092B-C50C-407E-A947-70E740481C1C}">
+                <a14:useLocalDpi xmlns:a14="http://schemas.microsoft.com/office/drawing/2010/main" val="0"/>
+              </a:ext>
+            </a:extLst>
+          </a:blip>
+          <a:srcRect/>
+          <a:stretch>
+            <a:fillRect/>
+          </a:stretch>
+        </p:blipFill>
+        <p:spPr bwMode="auto">
+          <a:xfrm>
+            <a:off x="6248400" y="4114800"/>
+            <a:ext cx="1905000" cy="1428750"/>
+          </a:xfrm>
+          <a:prstGeom prst="rect">
+            <a:avLst/>
+          </a:prstGeom>
+          <a:noFill/>
+          <a:extLst>
+            <a:ext uri="{909E8E84-426E-40DD-AFC4-6F175D3DCCD1}">
+              <a14:hiddenFill xmlns:a14="http://schemas.microsoft.com/office/drawing/2010/main">
+                <a:solidFill>
+                  <a:srgbClr val="FFFFFF"/>
+                </a:solidFill>
+              </a14:hiddenFill>
+            </a:ext>
+          </a:extLst>
+        </p:spPr>
+      </p:pic>
+      <p:sp>
+        <p:nvSpPr>
+          <p:cNvPr id="5" name="Rechteck 4"/>
+          <p:cNvSpPr/>
+          <p:nvPr/>
+        </p:nvSpPr>
+        <p:spPr>
+          <a:xfrm>
+            <a:off x="6248400" y="1538288"/>
+            <a:ext cx="1905000" cy="1428750"/>
+          </a:xfrm>
+          <a:prstGeom prst="rect">
+            <a:avLst/>
+          </a:prstGeom>
+          <a:noFill/>
+          <a:ln>
+            <a:prstDash val="dash"/>
+          </a:ln>
+        </p:spPr>
+        <p:style>
+          <a:lnRef idx="2">
+            <a:schemeClr val="accent1">
+              <a:shade val="50000"/>
+            </a:schemeClr>
+          </a:lnRef>
+          <a:fillRef idx="1">
+            <a:schemeClr val="accent1"/>
+          </a:fillRef>
+          <a:effectRef idx="0">
+            <a:schemeClr val="accent1"/>
+          </a:effectRef>
+          <a:fontRef idx="minor">
+            <a:schemeClr val="lt1"/>
+          </a:fontRef>
+        </p:style>
+        <p:txBody>
+          <a:bodyPr rtlCol="0" anchor="ctr"/>
+          <a:lstStyle/>
+          <a:p>
+            <a:pPr algn="ctr"/>
+            <a:endParaRPr lang="de-DE"/>
+          </a:p>
+        </p:txBody>
+      </p:sp>
+      <p:sp>
+        <p:nvSpPr>
+          <p:cNvPr id="10" name="Rechteck 9"/>
+          <p:cNvSpPr/>
+          <p:nvPr/>
+        </p:nvSpPr>
+        <p:spPr>
+          <a:xfrm>
+            <a:off x="828675" y="1544555"/>
+            <a:ext cx="1905000" cy="1428750"/>
+          </a:xfrm>
+          <a:prstGeom prst="rect">
+            <a:avLst/>
+          </a:prstGeom>
+          <a:noFill/>
+          <a:ln>
+            <a:prstDash val="dash"/>
+          </a:ln>
+        </p:spPr>
+        <p:style>
+          <a:lnRef idx="2">
+            <a:schemeClr val="accent1">
+              <a:shade val="50000"/>
+            </a:schemeClr>
+          </a:lnRef>
+          <a:fillRef idx="1">
+            <a:schemeClr val="accent1"/>
+          </a:fillRef>
+          <a:effectRef idx="0">
+            <a:schemeClr val="accent1"/>
+          </a:effectRef>
+          <a:fontRef idx="minor">
+            <a:schemeClr val="lt1"/>
+          </a:fontRef>
+        </p:style>
+        <p:txBody>
+          <a:bodyPr rtlCol="0" anchor="ctr"/>
+          <a:lstStyle/>
+          <a:p>
+            <a:pPr algn="ctr"/>
+            <a:endParaRPr lang="de-DE"/>
+          </a:p>
+        </p:txBody>
+      </p:sp>
+      <p:sp>
+        <p:nvSpPr>
+          <p:cNvPr id="11" name="Rechteck 10"/>
+          <p:cNvSpPr/>
+          <p:nvPr/>
+        </p:nvSpPr>
+        <p:spPr>
+          <a:xfrm>
+            <a:off x="6261234" y="4114800"/>
+            <a:ext cx="1905000" cy="1428750"/>
+          </a:xfrm>
+          <a:prstGeom prst="rect">
+            <a:avLst/>
+          </a:prstGeom>
+          <a:noFill/>
+          <a:ln>
+            <a:prstDash val="dash"/>
+          </a:ln>
+        </p:spPr>
+        <p:style>
+          <a:lnRef idx="2">
+            <a:schemeClr val="accent1">
+              <a:shade val="50000"/>
+            </a:schemeClr>
+          </a:lnRef>
+          <a:fillRef idx="1">
+            <a:schemeClr val="accent1"/>
+          </a:fillRef>
+          <a:effectRef idx="0">
+            <a:schemeClr val="accent1"/>
+          </a:effectRef>
+          <a:fontRef idx="minor">
+            <a:schemeClr val="lt1"/>
+          </a:fontRef>
+        </p:style>
+        <p:txBody>
+          <a:bodyPr rtlCol="0" anchor="ctr"/>
+          <a:lstStyle/>
+          <a:p>
+            <a:pPr algn="ctr"/>
+            <a:endParaRPr lang="de-DE"/>
+          </a:p>
+        </p:txBody>
+      </p:sp>
+      <p:sp>
+        <p:nvSpPr>
+          <p:cNvPr id="12" name="Rechteck 11"/>
+          <p:cNvSpPr/>
+          <p:nvPr/>
+        </p:nvSpPr>
+        <p:spPr>
+          <a:xfrm>
+            <a:off x="828675" y="4114800"/>
+            <a:ext cx="1905000" cy="1428750"/>
+          </a:xfrm>
+          <a:prstGeom prst="rect">
+            <a:avLst/>
+          </a:prstGeom>
+          <a:noFill/>
+          <a:ln>
+            <a:prstDash val="dash"/>
+          </a:ln>
+        </p:spPr>
+        <p:style>
+          <a:lnRef idx="2">
+            <a:schemeClr val="accent1">
+              <a:shade val="50000"/>
+            </a:schemeClr>
+          </a:lnRef>
+          <a:fillRef idx="1">
+            <a:schemeClr val="accent1"/>
+          </a:fillRef>
+          <a:effectRef idx="0">
+            <a:schemeClr val="accent1"/>
+          </a:effectRef>
+          <a:fontRef idx="minor">
+            <a:schemeClr val="lt1"/>
+          </a:fontRef>
+        </p:style>
+        <p:txBody>
+          <a:bodyPr rtlCol="0" anchor="ctr"/>
+          <a:lstStyle/>
+          <a:p>
+            <a:pPr algn="ctr"/>
+            <a:endParaRPr lang="de-DE"/>
+          </a:p>
+        </p:txBody>
+      </p:sp>
+      <p:sp>
+        <p:nvSpPr>
+          <p:cNvPr id="13" name="Pfeil nach unten 12"/>
+          <p:cNvSpPr/>
+          <p:nvPr/>
+        </p:nvSpPr>
+        <p:spPr>
+          <a:xfrm rot="3904123">
+            <a:off x="5659717" y="2651713"/>
+            <a:ext cx="361598" cy="568784"/>
+          </a:xfrm>
+          <a:prstGeom prst="downArrow">
+            <a:avLst>
+              <a:gd name="adj1" fmla="val 44533"/>
+              <a:gd name="adj2" fmla="val 50000"/>
+            </a:avLst>
+          </a:prstGeom>
+        </p:spPr>
+        <p:style>
+          <a:lnRef idx="2">
+            <a:schemeClr val="accent1">
+              <a:shade val="50000"/>
+            </a:schemeClr>
+          </a:lnRef>
+          <a:fillRef idx="1">
+            <a:schemeClr val="accent1"/>
+          </a:fillRef>
+          <a:effectRef idx="0">
+            <a:schemeClr val="accent1"/>
+          </a:effectRef>
+          <a:fontRef idx="minor">
+            <a:schemeClr val="lt1"/>
+          </a:fontRef>
+        </p:style>
+        <p:txBody>
+          <a:bodyPr rtlCol="0" anchor="ctr"/>
+          <a:lstStyle/>
+          <a:p>
+            <a:pPr algn="ctr"/>
+            <a:endParaRPr lang="de-DE"/>
+          </a:p>
+        </p:txBody>
+      </p:sp>
+      <p:pic>
+        <p:nvPicPr>
+          <p:cNvPr id="4098" name="Picture 2" descr="C:\Users\Tobi\Desktop\Daten\Studium\3Semester\PSE 2012\visual_cryptography\ShareKombo1.png"/>
+          <p:cNvPicPr>
+            <a:picLocks noChangeAspect="1" noChangeArrowheads="1"/>
+          </p:cNvPicPr>
+          <p:nvPr/>
+        </p:nvPicPr>
+        <p:blipFill>
+          <a:blip r:embed="rId5">
+            <a:extLst>
+              <a:ext uri="{28A0092B-C50C-407E-A947-70E740481C1C}">
+                <a14:useLocalDpi xmlns:a14="http://schemas.microsoft.com/office/drawing/2010/main" val="0"/>
+              </a:ext>
+            </a:extLst>
+          </a:blip>
+          <a:srcRect/>
+          <a:stretch>
+            <a:fillRect/>
+          </a:stretch>
+        </p:blipFill>
+        <p:spPr bwMode="auto">
+          <a:xfrm>
+            <a:off x="3581400" y="2838450"/>
+            <a:ext cx="1905000" cy="1428750"/>
+          </a:xfrm>
+          <a:prstGeom prst="rect">
+            <a:avLst/>
+          </a:prstGeom>
+          <a:noFill/>
+          <a:extLst>
+            <a:ext uri="{909E8E84-426E-40DD-AFC4-6F175D3DCCD1}">
+              <a14:hiddenFill xmlns:a14="http://schemas.microsoft.com/office/drawing/2010/main">
+                <a:solidFill>
+                  <a:srgbClr val="FFFFFF"/>
+                </a:solidFill>
+              </a14:hiddenFill>
+            </a:ext>
+          </a:extLst>
+        </p:spPr>
+      </p:pic>
+      <p:sp>
+        <p:nvSpPr>
+          <p:cNvPr id="14" name="Pfeil nach unten 13"/>
+          <p:cNvSpPr/>
+          <p:nvPr/>
+        </p:nvSpPr>
+        <p:spPr>
+          <a:xfrm rot="-3900000">
+            <a:off x="2972757" y="2631959"/>
+            <a:ext cx="361598" cy="568784"/>
+          </a:xfrm>
+          <a:prstGeom prst="downArrow">
+            <a:avLst>
+              <a:gd name="adj1" fmla="val 44533"/>
+              <a:gd name="adj2" fmla="val 50000"/>
+            </a:avLst>
+          </a:prstGeom>
+        </p:spPr>
+        <p:style>
+          <a:lnRef idx="2">
+            <a:schemeClr val="accent1">
+              <a:shade val="50000"/>
+            </a:schemeClr>
+          </a:lnRef>
+          <a:fillRef idx="1">
+            <a:schemeClr val="accent1"/>
+          </a:fillRef>
+          <a:effectRef idx="0">
+            <a:schemeClr val="accent1"/>
+          </a:effectRef>
+          <a:fontRef idx="minor">
+            <a:schemeClr val="lt1"/>
+          </a:fontRef>
+        </p:style>
+        <p:txBody>
+          <a:bodyPr rtlCol="0" anchor="ctr"/>
+          <a:lstStyle/>
+          <a:p>
+            <a:pPr algn="ctr"/>
+            <a:endParaRPr lang="de-DE"/>
+          </a:p>
+        </p:txBody>
+      </p:sp>
+    </p:spTree>
+    <p:extLst>
+      <p:ext uri="{BB962C8B-B14F-4D97-AF65-F5344CB8AC3E}">
+        <p14:creationId xmlns:p14="http://schemas.microsoft.com/office/powerpoint/2010/main" val="366909916"/>
+      </p:ext>
+    </p:extLst>
+  </p:cSld>
+  <p:clrMapOvr>
+    <a:masterClrMapping/>
+  </p:clrMapOvr>
+  <p:timing>
+    <p:tnLst>
+      <p:par>
+        <p:cTn id="1" dur="indefinite" restart="never" nodeType="tmRoot"/>
+      </p:par>
+    </p:tnLst>
+  </p:timing>
+</p:sld>
+</file>
+
+<file path=ppt/slides/slide17.xml><?xml version="1.0" encoding="utf-8"?>
+<p:sld xmlns:a="http://schemas.openxmlformats.org/drawingml/2006/main" xmlns:r="http://schemas.openxmlformats.org/officeDocument/2006/relationships" xmlns:p="http://schemas.openxmlformats.org/presentationml/2006/main">
+  <p:cSld>
+    <p:spTree>
+      <p:nvGrpSpPr>
+        <p:cNvPr id="1" name=""/>
+        <p:cNvGrpSpPr/>
+        <p:nvPr/>
+      </p:nvGrpSpPr>
+      <p:grpSpPr>
+        <a:xfrm>
+          <a:off x="0" y="0"/>
+          <a:ext cx="0" cy="0"/>
+          <a:chOff x="0" y="0"/>
+          <a:chExt cx="0" cy="0"/>
+        </a:xfrm>
+      </p:grpSpPr>
+      <p:pic>
+        <p:nvPicPr>
+          <p:cNvPr id="2051" name="Picture 3" descr="C:\Users\Tobi\Desktop\Daten\Studium\3Semester\PSE 2012\visual_cryptography\Share2.png"/>
+          <p:cNvPicPr>
+            <a:picLocks noChangeAspect="1" noChangeArrowheads="1"/>
+          </p:cNvPicPr>
+          <p:nvPr/>
+        </p:nvPicPr>
+        <p:blipFill>
+          <a:blip r:embed="rId3">
+            <a:extLst>
+              <a:ext uri="{28A0092B-C50C-407E-A947-70E740481C1C}">
+                <a14:useLocalDpi xmlns:a14="http://schemas.microsoft.com/office/drawing/2010/main" val="0"/>
+              </a:ext>
+            </a:extLst>
+          </a:blip>
+          <a:srcRect/>
+          <a:stretch>
+            <a:fillRect/>
+          </a:stretch>
+        </p:blipFill>
+        <p:spPr bwMode="auto">
+          <a:xfrm>
+            <a:off x="3581400" y="2838450"/>
+            <a:ext cx="1905000" cy="1428750"/>
+          </a:xfrm>
+          <a:prstGeom prst="rect">
+            <a:avLst/>
+          </a:prstGeom>
+          <a:noFill/>
+          <a:ln>
+            <a:noFill/>
+            <a:prstDash val="dash"/>
+          </a:ln>
+          <a:extLst>
+            <a:ext uri="{909E8E84-426E-40DD-AFC4-6F175D3DCCD1}">
+              <a14:hiddenFill xmlns:a14="http://schemas.microsoft.com/office/drawing/2010/main">
+                <a:solidFill>
+                  <a:srgbClr val="FFFFFF"/>
+                </a:solidFill>
+              </a14:hiddenFill>
+            </a:ext>
+          </a:extLst>
+        </p:spPr>
+      </p:pic>
+      <p:sp>
+        <p:nvSpPr>
+          <p:cNvPr id="2" name="Titel 1"/>
+          <p:cNvSpPr>
+            <a:spLocks noGrp="1"/>
+          </p:cNvSpPr>
+          <p:nvPr>
+            <p:ph type="title"/>
+          </p:nvPr>
+        </p:nvSpPr>
+        <p:spPr/>
+        <p:txBody>
+          <a:bodyPr/>
+          <a:lstStyle/>
+          <a:p>
+            <a:endParaRPr lang="de-DE"/>
+          </a:p>
+        </p:txBody>
+      </p:sp>
+      <p:sp>
+        <p:nvSpPr>
+          <p:cNvPr id="4" name="Fußzeilenplatzhalter 3"/>
+          <p:cNvSpPr>
+            <a:spLocks noGrp="1"/>
+          </p:cNvSpPr>
+          <p:nvPr>
+            <p:ph type="ftr" sz="quarter" idx="10"/>
+          </p:nvPr>
+        </p:nvSpPr>
+        <p:spPr/>
+        <p:txBody>
+          <a:bodyPr/>
+          <a:lstStyle/>
+          <a:p>
+            <a:r>
+              <a:rPr lang="de-DE" smtClean="0"/>
+              <a:t>Name Vorname: Titel des Vortrags</a:t>
+            </a:r>
+            <a:endParaRPr lang="de-DE"/>
+          </a:p>
+        </p:txBody>
+      </p:sp>
+      <p:pic>
+        <p:nvPicPr>
+          <p:cNvPr id="2053" name="Picture 5" descr="C:\Users\Tobi\Desktop\Daten\Studium\3Semester\PSE 2012\visual_cryptography\Share4.png"/>
+          <p:cNvPicPr>
+            <a:picLocks noChangeAspect="1" noChangeArrowheads="1"/>
+          </p:cNvPicPr>
+          <p:nvPr/>
+        </p:nvPicPr>
+        <p:blipFill>
+          <a:blip r:embed="rId4">
+            <a:extLst>
+              <a:ext uri="{28A0092B-C50C-407E-A947-70E740481C1C}">
+                <a14:useLocalDpi xmlns:a14="http://schemas.microsoft.com/office/drawing/2010/main" val="0"/>
+              </a:ext>
+            </a:extLst>
+          </a:blip>
+          <a:srcRect/>
+          <a:stretch>
+            <a:fillRect/>
+          </a:stretch>
+        </p:blipFill>
+        <p:spPr bwMode="auto">
+          <a:xfrm>
+            <a:off x="6248400" y="4114800"/>
+            <a:ext cx="1905000" cy="1428750"/>
+          </a:xfrm>
+          <a:prstGeom prst="rect">
+            <a:avLst/>
+          </a:prstGeom>
+          <a:noFill/>
+          <a:extLst>
+            <a:ext uri="{909E8E84-426E-40DD-AFC4-6F175D3DCCD1}">
+              <a14:hiddenFill xmlns:a14="http://schemas.microsoft.com/office/drawing/2010/main">
+                <a:solidFill>
+                  <a:srgbClr val="FFFFFF"/>
+                </a:solidFill>
+              </a14:hiddenFill>
+            </a:ext>
+          </a:extLst>
+        </p:spPr>
+      </p:pic>
+      <p:sp>
+        <p:nvSpPr>
+          <p:cNvPr id="5" name="Rechteck 4"/>
+          <p:cNvSpPr/>
+          <p:nvPr/>
+        </p:nvSpPr>
+        <p:spPr>
+          <a:xfrm>
+            <a:off x="6248400" y="1538288"/>
+            <a:ext cx="1905000" cy="1428750"/>
+          </a:xfrm>
+          <a:prstGeom prst="rect">
+            <a:avLst/>
+          </a:prstGeom>
+          <a:noFill/>
+          <a:ln>
+            <a:prstDash val="dash"/>
+          </a:ln>
+        </p:spPr>
+        <p:style>
+          <a:lnRef idx="2">
+            <a:schemeClr val="accent1">
+              <a:shade val="50000"/>
+            </a:schemeClr>
+          </a:lnRef>
+          <a:fillRef idx="1">
+            <a:schemeClr val="accent1"/>
+          </a:fillRef>
+          <a:effectRef idx="0">
+            <a:schemeClr val="accent1"/>
+          </a:effectRef>
+          <a:fontRef idx="minor">
+            <a:schemeClr val="lt1"/>
+          </a:fontRef>
+        </p:style>
+        <p:txBody>
+          <a:bodyPr rtlCol="0" anchor="ctr"/>
+          <a:lstStyle/>
+          <a:p>
+            <a:pPr algn="ctr"/>
+            <a:endParaRPr lang="de-DE"/>
+          </a:p>
+        </p:txBody>
+      </p:sp>
+      <p:sp>
+        <p:nvSpPr>
+          <p:cNvPr id="10" name="Rechteck 9"/>
+          <p:cNvSpPr/>
+          <p:nvPr/>
+        </p:nvSpPr>
+        <p:spPr>
+          <a:xfrm>
+            <a:off x="828675" y="1544555"/>
+            <a:ext cx="1905000" cy="1428750"/>
+          </a:xfrm>
+          <a:prstGeom prst="rect">
+            <a:avLst/>
+          </a:prstGeom>
+          <a:noFill/>
+          <a:ln>
+            <a:prstDash val="dash"/>
+          </a:ln>
+        </p:spPr>
+        <p:style>
+          <a:lnRef idx="2">
+            <a:schemeClr val="accent1">
+              <a:shade val="50000"/>
+            </a:schemeClr>
+          </a:lnRef>
+          <a:fillRef idx="1">
+            <a:schemeClr val="accent1"/>
+          </a:fillRef>
+          <a:effectRef idx="0">
+            <a:schemeClr val="accent1"/>
+          </a:effectRef>
+          <a:fontRef idx="minor">
+            <a:schemeClr val="lt1"/>
+          </a:fontRef>
+        </p:style>
+        <p:txBody>
+          <a:bodyPr rtlCol="0" anchor="ctr"/>
+          <a:lstStyle/>
+          <a:p>
+            <a:pPr algn="ctr"/>
+            <a:endParaRPr lang="de-DE"/>
+          </a:p>
+        </p:txBody>
+      </p:sp>
+      <p:sp>
+        <p:nvSpPr>
+          <p:cNvPr id="11" name="Rechteck 10"/>
+          <p:cNvSpPr/>
+          <p:nvPr/>
+        </p:nvSpPr>
+        <p:spPr>
+          <a:xfrm>
+            <a:off x="6261234" y="4114800"/>
+            <a:ext cx="1905000" cy="1428750"/>
+          </a:xfrm>
+          <a:prstGeom prst="rect">
+            <a:avLst/>
+          </a:prstGeom>
+          <a:noFill/>
+          <a:ln>
+            <a:prstDash val="dash"/>
+          </a:ln>
+        </p:spPr>
+        <p:style>
+          <a:lnRef idx="2">
+            <a:schemeClr val="accent1">
+              <a:shade val="50000"/>
+            </a:schemeClr>
+          </a:lnRef>
+          <a:fillRef idx="1">
+            <a:schemeClr val="accent1"/>
+          </a:fillRef>
+          <a:effectRef idx="0">
+            <a:schemeClr val="accent1"/>
+          </a:effectRef>
+          <a:fontRef idx="minor">
+            <a:schemeClr val="lt1"/>
+          </a:fontRef>
+        </p:style>
+        <p:txBody>
+          <a:bodyPr rtlCol="0" anchor="ctr"/>
+          <a:lstStyle/>
+          <a:p>
+            <a:pPr algn="ctr"/>
+            <a:endParaRPr lang="de-DE"/>
+          </a:p>
+        </p:txBody>
+      </p:sp>
+      <p:sp>
+        <p:nvSpPr>
+          <p:cNvPr id="12" name="Rechteck 11"/>
+          <p:cNvSpPr/>
+          <p:nvPr/>
+        </p:nvSpPr>
+        <p:spPr>
+          <a:xfrm>
+            <a:off x="828675" y="4114800"/>
+            <a:ext cx="1905000" cy="1428750"/>
+          </a:xfrm>
+          <a:prstGeom prst="rect">
+            <a:avLst/>
+          </a:prstGeom>
+          <a:noFill/>
+          <a:ln>
+            <a:prstDash val="dash"/>
+          </a:ln>
+        </p:spPr>
+        <p:style>
+          <a:lnRef idx="2">
+            <a:schemeClr val="accent1">
+              <a:shade val="50000"/>
+            </a:schemeClr>
+          </a:lnRef>
+          <a:fillRef idx="1">
+            <a:schemeClr val="accent1"/>
+          </a:fillRef>
+          <a:effectRef idx="0">
+            <a:schemeClr val="accent1"/>
+          </a:effectRef>
+          <a:fontRef idx="minor">
+            <a:schemeClr val="lt1"/>
+          </a:fontRef>
+        </p:style>
+        <p:txBody>
+          <a:bodyPr rtlCol="0" anchor="ctr"/>
+          <a:lstStyle/>
+          <a:p>
+            <a:pPr algn="ctr"/>
+            <a:endParaRPr lang="de-DE"/>
+          </a:p>
+        </p:txBody>
+      </p:sp>
+      <p:sp>
+        <p:nvSpPr>
+          <p:cNvPr id="13" name="Pfeil nach unten 12"/>
+          <p:cNvSpPr/>
+          <p:nvPr/>
+        </p:nvSpPr>
+        <p:spPr>
+          <a:xfrm rot="3904123">
+            <a:off x="5659717" y="2651713"/>
+            <a:ext cx="361598" cy="568784"/>
+          </a:xfrm>
+          <a:prstGeom prst="downArrow">
+            <a:avLst>
+              <a:gd name="adj1" fmla="val 44533"/>
+              <a:gd name="adj2" fmla="val 50000"/>
+            </a:avLst>
+          </a:prstGeom>
+        </p:spPr>
+        <p:style>
+          <a:lnRef idx="2">
+            <a:schemeClr val="accent1">
+              <a:shade val="50000"/>
+            </a:schemeClr>
+          </a:lnRef>
+          <a:fillRef idx="1">
+            <a:schemeClr val="accent1"/>
+          </a:fillRef>
+          <a:effectRef idx="0">
+            <a:schemeClr val="accent1"/>
+          </a:effectRef>
+          <a:fontRef idx="minor">
+            <a:schemeClr val="lt1"/>
+          </a:fontRef>
+        </p:style>
+        <p:txBody>
+          <a:bodyPr rtlCol="0" anchor="ctr"/>
+          <a:lstStyle/>
+          <a:p>
+            <a:pPr algn="ctr"/>
+            <a:endParaRPr lang="de-DE"/>
+          </a:p>
+        </p:txBody>
+      </p:sp>
+      <p:pic>
+        <p:nvPicPr>
+          <p:cNvPr id="4098" name="Picture 2" descr="C:\Users\Tobi\Desktop\Daten\Studium\3Semester\PSE 2012\visual_cryptography\ShareKombo1.png"/>
+          <p:cNvPicPr>
+            <a:picLocks noChangeAspect="1" noChangeArrowheads="1"/>
+          </p:cNvPicPr>
+          <p:nvPr/>
+        </p:nvPicPr>
+        <p:blipFill>
+          <a:blip r:embed="rId5">
+            <a:extLst>
+              <a:ext uri="{28A0092B-C50C-407E-A947-70E740481C1C}">
+                <a14:useLocalDpi xmlns:a14="http://schemas.microsoft.com/office/drawing/2010/main" val="0"/>
+              </a:ext>
+            </a:extLst>
+          </a:blip>
+          <a:srcRect/>
+          <a:stretch>
+            <a:fillRect/>
+          </a:stretch>
+        </p:blipFill>
+        <p:spPr bwMode="auto">
+          <a:xfrm>
+            <a:off x="3581400" y="2838450"/>
+            <a:ext cx="1905000" cy="1428750"/>
+          </a:xfrm>
+          <a:prstGeom prst="rect">
+            <a:avLst/>
+          </a:prstGeom>
+          <a:noFill/>
+          <a:extLst>
+            <a:ext uri="{909E8E84-426E-40DD-AFC4-6F175D3DCCD1}">
+              <a14:hiddenFill xmlns:a14="http://schemas.microsoft.com/office/drawing/2010/main">
+                <a:solidFill>
+                  <a:srgbClr val="FFFFFF"/>
+                </a:solidFill>
+              </a14:hiddenFill>
+            </a:ext>
+          </a:extLst>
+        </p:spPr>
+      </p:pic>
+      <p:sp>
+        <p:nvSpPr>
+          <p:cNvPr id="14" name="Pfeil nach unten 13"/>
+          <p:cNvSpPr/>
+          <p:nvPr/>
+        </p:nvSpPr>
+        <p:spPr>
+          <a:xfrm rot="-3900000">
+            <a:off x="2972757" y="2631959"/>
+            <a:ext cx="361598" cy="568784"/>
+          </a:xfrm>
+          <a:prstGeom prst="downArrow">
+            <a:avLst>
+              <a:gd name="adj1" fmla="val 44533"/>
+              <a:gd name="adj2" fmla="val 50000"/>
+            </a:avLst>
+          </a:prstGeom>
+        </p:spPr>
+        <p:style>
+          <a:lnRef idx="2">
+            <a:schemeClr val="accent1">
+              <a:shade val="50000"/>
+            </a:schemeClr>
+          </a:lnRef>
+          <a:fillRef idx="1">
+            <a:schemeClr val="accent1"/>
+          </a:fillRef>
+          <a:effectRef idx="0">
+            <a:schemeClr val="accent1"/>
+          </a:effectRef>
+          <a:fontRef idx="minor">
+            <a:schemeClr val="lt1"/>
+          </a:fontRef>
+        </p:style>
+        <p:txBody>
+          <a:bodyPr rtlCol="0" anchor="ctr"/>
+          <a:lstStyle/>
+          <a:p>
+            <a:pPr algn="ctr"/>
+            <a:endParaRPr lang="de-DE"/>
+          </a:p>
+        </p:txBody>
+      </p:sp>
+      <p:pic>
+        <p:nvPicPr>
+          <p:cNvPr id="5122" name="Picture 2" descr="C:\Users\Tobi\Desktop\Daten\Studium\3Semester\PSE 2012\visual_cryptography\ShareKombo2.png"/>
+          <p:cNvPicPr>
+            <a:picLocks noChangeAspect="1" noChangeArrowheads="1"/>
+          </p:cNvPicPr>
+          <p:nvPr/>
+        </p:nvPicPr>
+        <p:blipFill>
+          <a:blip r:embed="rId6">
+            <a:extLst>
+              <a:ext uri="{28A0092B-C50C-407E-A947-70E740481C1C}">
+                <a14:useLocalDpi xmlns:a14="http://schemas.microsoft.com/office/drawing/2010/main" val="0"/>
+              </a:ext>
+            </a:extLst>
+          </a:blip>
+          <a:srcRect/>
+          <a:stretch>
+            <a:fillRect/>
+          </a:stretch>
+        </p:blipFill>
+        <p:spPr bwMode="auto">
+          <a:xfrm>
+            <a:off x="3581400" y="2838082"/>
+            <a:ext cx="1905000" cy="1428750"/>
+          </a:xfrm>
+          <a:prstGeom prst="rect">
+            <a:avLst/>
+          </a:prstGeom>
+          <a:noFill/>
+          <a:extLst>
+            <a:ext uri="{909E8E84-426E-40DD-AFC4-6F175D3DCCD1}">
+              <a14:hiddenFill xmlns:a14="http://schemas.microsoft.com/office/drawing/2010/main">
+                <a:solidFill>
+                  <a:srgbClr val="FFFFFF"/>
+                </a:solidFill>
+              </a14:hiddenFill>
+            </a:ext>
+          </a:extLst>
+        </p:spPr>
+      </p:pic>
+      <p:sp>
+        <p:nvSpPr>
+          <p:cNvPr id="15" name="Pfeil nach unten 14"/>
+          <p:cNvSpPr/>
+          <p:nvPr/>
+        </p:nvSpPr>
+        <p:spPr>
+          <a:xfrm rot="14700000">
+            <a:off x="2972757" y="3982807"/>
+            <a:ext cx="361598" cy="568784"/>
+          </a:xfrm>
+          <a:prstGeom prst="downArrow">
+            <a:avLst>
+              <a:gd name="adj1" fmla="val 44533"/>
+              <a:gd name="adj2" fmla="val 50000"/>
+            </a:avLst>
+          </a:prstGeom>
+        </p:spPr>
+        <p:style>
+          <a:lnRef idx="2">
+            <a:schemeClr val="accent1">
+              <a:shade val="50000"/>
+            </a:schemeClr>
+          </a:lnRef>
+          <a:fillRef idx="1">
+            <a:schemeClr val="accent1"/>
+          </a:fillRef>
+          <a:effectRef idx="0">
+            <a:schemeClr val="accent1"/>
+          </a:effectRef>
+          <a:fontRef idx="minor">
+            <a:schemeClr val="lt1"/>
+          </a:fontRef>
+        </p:style>
+        <p:txBody>
+          <a:bodyPr rtlCol="0" anchor="ctr"/>
+          <a:lstStyle/>
+          <a:p>
+            <a:pPr algn="ctr"/>
+            <a:endParaRPr lang="de-DE"/>
+          </a:p>
+        </p:txBody>
+      </p:sp>
+    </p:spTree>
+    <p:extLst>
+      <p:ext uri="{BB962C8B-B14F-4D97-AF65-F5344CB8AC3E}">
+        <p14:creationId xmlns:p14="http://schemas.microsoft.com/office/powerpoint/2010/main" val="4059384192"/>
+      </p:ext>
+    </p:extLst>
+  </p:cSld>
+  <p:clrMapOvr>
+    <a:masterClrMapping/>
+  </p:clrMapOvr>
+  <p:timing>
+    <p:tnLst>
+      <p:par>
+        <p:cTn id="1" dur="indefinite" restart="never" nodeType="tmRoot"/>
+      </p:par>
+    </p:tnLst>
+  </p:timing>
+</p:sld>
+</file>
+
+<file path=ppt/slides/slide18.xml><?xml version="1.0" encoding="utf-8"?>
+<p:sld xmlns:a="http://schemas.openxmlformats.org/drawingml/2006/main" xmlns:r="http://schemas.openxmlformats.org/officeDocument/2006/relationships" xmlns:p="http://schemas.openxmlformats.org/presentationml/2006/main">
+  <p:cSld>
+    <p:spTree>
+      <p:nvGrpSpPr>
+        <p:cNvPr id="1" name=""/>
+        <p:cNvGrpSpPr/>
+        <p:nvPr/>
+      </p:nvGrpSpPr>
+      <p:grpSpPr>
+        <a:xfrm>
+          <a:off x="0" y="0"/>
+          <a:ext cx="0" cy="0"/>
+          <a:chOff x="0" y="0"/>
+          <a:chExt cx="0" cy="0"/>
+        </a:xfrm>
+      </p:grpSpPr>
+      <p:pic>
+        <p:nvPicPr>
+          <p:cNvPr id="2051" name="Picture 3" descr="C:\Users\Tobi\Desktop\Daten\Studium\3Semester\PSE 2012\visual_cryptography\Share2.png"/>
+          <p:cNvPicPr>
+            <a:picLocks noChangeAspect="1" noChangeArrowheads="1"/>
+          </p:cNvPicPr>
+          <p:nvPr/>
+        </p:nvPicPr>
+        <p:blipFill>
+          <a:blip r:embed="rId2">
+            <a:extLst>
+              <a:ext uri="{28A0092B-C50C-407E-A947-70E740481C1C}">
+                <a14:useLocalDpi xmlns:a14="http://schemas.microsoft.com/office/drawing/2010/main" val="0"/>
+              </a:ext>
+            </a:extLst>
+          </a:blip>
+          <a:srcRect/>
+          <a:stretch>
+            <a:fillRect/>
+          </a:stretch>
+        </p:blipFill>
+        <p:spPr bwMode="auto">
+          <a:xfrm>
+            <a:off x="3581400" y="2838450"/>
+            <a:ext cx="1905000" cy="1428750"/>
+          </a:xfrm>
+          <a:prstGeom prst="rect">
+            <a:avLst/>
+          </a:prstGeom>
+          <a:noFill/>
+          <a:ln>
+            <a:noFill/>
+            <a:prstDash val="dash"/>
+          </a:ln>
+          <a:extLst>
+            <a:ext uri="{909E8E84-426E-40DD-AFC4-6F175D3DCCD1}">
+              <a14:hiddenFill xmlns:a14="http://schemas.microsoft.com/office/drawing/2010/main">
+                <a:solidFill>
+                  <a:srgbClr val="FFFFFF"/>
+                </a:solidFill>
+              </a14:hiddenFill>
+            </a:ext>
+          </a:extLst>
+        </p:spPr>
+      </p:pic>
+      <p:sp>
+        <p:nvSpPr>
+          <p:cNvPr id="2" name="Titel 1"/>
+          <p:cNvSpPr>
+            <a:spLocks noGrp="1"/>
+          </p:cNvSpPr>
+          <p:nvPr>
+            <p:ph type="title"/>
+          </p:nvPr>
+        </p:nvSpPr>
+        <p:spPr/>
+        <p:txBody>
+          <a:bodyPr/>
+          <a:lstStyle/>
+          <a:p>
+            <a:endParaRPr lang="de-DE"/>
+          </a:p>
+        </p:txBody>
+      </p:sp>
+      <p:sp>
+        <p:nvSpPr>
+          <p:cNvPr id="4" name="Fußzeilenplatzhalter 3"/>
+          <p:cNvSpPr>
+            <a:spLocks noGrp="1"/>
+          </p:cNvSpPr>
+          <p:nvPr>
+            <p:ph type="ftr" sz="quarter" idx="10"/>
+          </p:nvPr>
+        </p:nvSpPr>
+        <p:spPr/>
+        <p:txBody>
+          <a:bodyPr/>
+          <a:lstStyle/>
+          <a:p>
+            <a:r>
+              <a:rPr lang="de-DE" smtClean="0"/>
+              <a:t>Name Vorname: Titel des Vortrags</a:t>
+            </a:r>
+            <a:endParaRPr lang="de-DE"/>
+          </a:p>
+        </p:txBody>
+      </p:sp>
+      <p:sp>
+        <p:nvSpPr>
+          <p:cNvPr id="5" name="Rechteck 4"/>
+          <p:cNvSpPr/>
+          <p:nvPr/>
+        </p:nvSpPr>
+        <p:spPr>
+          <a:xfrm>
+            <a:off x="6248400" y="1538288"/>
+            <a:ext cx="1905000" cy="1428750"/>
+          </a:xfrm>
+          <a:prstGeom prst="rect">
+            <a:avLst/>
+          </a:prstGeom>
+          <a:noFill/>
+          <a:ln>
+            <a:prstDash val="dash"/>
+          </a:ln>
+        </p:spPr>
+        <p:style>
+          <a:lnRef idx="2">
+            <a:schemeClr val="accent1">
+              <a:shade val="50000"/>
+            </a:schemeClr>
+          </a:lnRef>
+          <a:fillRef idx="1">
+            <a:schemeClr val="accent1"/>
+          </a:fillRef>
+          <a:effectRef idx="0">
+            <a:schemeClr val="accent1"/>
+          </a:effectRef>
+          <a:fontRef idx="minor">
+            <a:schemeClr val="lt1"/>
+          </a:fontRef>
+        </p:style>
+        <p:txBody>
+          <a:bodyPr rtlCol="0" anchor="ctr"/>
+          <a:lstStyle/>
+          <a:p>
+            <a:pPr algn="ctr"/>
+            <a:endParaRPr lang="de-DE"/>
+          </a:p>
+        </p:txBody>
+      </p:sp>
+      <p:sp>
+        <p:nvSpPr>
+          <p:cNvPr id="10" name="Rechteck 9"/>
+          <p:cNvSpPr/>
+          <p:nvPr/>
+        </p:nvSpPr>
+        <p:spPr>
+          <a:xfrm>
+            <a:off x="828675" y="1544555"/>
+            <a:ext cx="1905000" cy="1428750"/>
+          </a:xfrm>
+          <a:prstGeom prst="rect">
+            <a:avLst/>
+          </a:prstGeom>
+          <a:noFill/>
+          <a:ln>
+            <a:prstDash val="dash"/>
+          </a:ln>
+        </p:spPr>
+        <p:style>
+          <a:lnRef idx="2">
+            <a:schemeClr val="accent1">
+              <a:shade val="50000"/>
+            </a:schemeClr>
+          </a:lnRef>
+          <a:fillRef idx="1">
+            <a:schemeClr val="accent1"/>
+          </a:fillRef>
+          <a:effectRef idx="0">
+            <a:schemeClr val="accent1"/>
+          </a:effectRef>
+          <a:fontRef idx="minor">
+            <a:schemeClr val="lt1"/>
+          </a:fontRef>
+        </p:style>
+        <p:txBody>
+          <a:bodyPr rtlCol="0" anchor="ctr"/>
+          <a:lstStyle/>
+          <a:p>
+            <a:pPr algn="ctr"/>
+            <a:endParaRPr lang="de-DE"/>
+          </a:p>
+        </p:txBody>
+      </p:sp>
+      <p:sp>
+        <p:nvSpPr>
+          <p:cNvPr id="11" name="Rechteck 10"/>
+          <p:cNvSpPr/>
+          <p:nvPr/>
+        </p:nvSpPr>
+        <p:spPr>
+          <a:xfrm>
+            <a:off x="6261234" y="4114800"/>
+            <a:ext cx="1905000" cy="1428750"/>
+          </a:xfrm>
+          <a:prstGeom prst="rect">
+            <a:avLst/>
+          </a:prstGeom>
+          <a:noFill/>
+          <a:ln>
+            <a:prstDash val="dash"/>
+          </a:ln>
+        </p:spPr>
+        <p:style>
+          <a:lnRef idx="2">
+            <a:schemeClr val="accent1">
+              <a:shade val="50000"/>
+            </a:schemeClr>
+          </a:lnRef>
+          <a:fillRef idx="1">
+            <a:schemeClr val="accent1"/>
+          </a:fillRef>
+          <a:effectRef idx="0">
+            <a:schemeClr val="accent1"/>
+          </a:effectRef>
+          <a:fontRef idx="minor">
+            <a:schemeClr val="lt1"/>
+          </a:fontRef>
+        </p:style>
+        <p:txBody>
+          <a:bodyPr rtlCol="0" anchor="ctr"/>
+          <a:lstStyle/>
+          <a:p>
+            <a:pPr algn="ctr"/>
+            <a:endParaRPr lang="de-DE"/>
+          </a:p>
+        </p:txBody>
+      </p:sp>
+      <p:sp>
+        <p:nvSpPr>
+          <p:cNvPr id="12" name="Rechteck 11"/>
+          <p:cNvSpPr/>
+          <p:nvPr/>
+        </p:nvSpPr>
+        <p:spPr>
+          <a:xfrm>
+            <a:off x="828675" y="4114800"/>
+            <a:ext cx="1905000" cy="1428750"/>
+          </a:xfrm>
+          <a:prstGeom prst="rect">
+            <a:avLst/>
+          </a:prstGeom>
+          <a:noFill/>
+          <a:ln>
+            <a:prstDash val="dash"/>
+          </a:ln>
+        </p:spPr>
+        <p:style>
+          <a:lnRef idx="2">
+            <a:schemeClr val="accent1">
+              <a:shade val="50000"/>
+            </a:schemeClr>
+          </a:lnRef>
+          <a:fillRef idx="1">
+            <a:schemeClr val="accent1"/>
+          </a:fillRef>
+          <a:effectRef idx="0">
+            <a:schemeClr val="accent1"/>
+          </a:effectRef>
+          <a:fontRef idx="minor">
+            <a:schemeClr val="lt1"/>
+          </a:fontRef>
+        </p:style>
+        <p:txBody>
+          <a:bodyPr rtlCol="0" anchor="ctr"/>
+          <a:lstStyle/>
+          <a:p>
+            <a:pPr algn="ctr"/>
+            <a:endParaRPr lang="de-DE"/>
+          </a:p>
+        </p:txBody>
+      </p:sp>
+      <p:sp>
+        <p:nvSpPr>
+          <p:cNvPr id="13" name="Pfeil nach unten 12"/>
+          <p:cNvSpPr/>
+          <p:nvPr/>
+        </p:nvSpPr>
+        <p:spPr>
+          <a:xfrm rot="3904123">
+            <a:off x="5659717" y="2651713"/>
+            <a:ext cx="361598" cy="568784"/>
+          </a:xfrm>
+          <a:prstGeom prst="downArrow">
+            <a:avLst>
+              <a:gd name="adj1" fmla="val 44533"/>
+              <a:gd name="adj2" fmla="val 50000"/>
+            </a:avLst>
+          </a:prstGeom>
+        </p:spPr>
+        <p:style>
+          <a:lnRef idx="2">
+            <a:schemeClr val="accent1">
+              <a:shade val="50000"/>
+            </a:schemeClr>
+          </a:lnRef>
+          <a:fillRef idx="1">
+            <a:schemeClr val="accent1"/>
+          </a:fillRef>
+          <a:effectRef idx="0">
+            <a:schemeClr val="accent1"/>
+          </a:effectRef>
+          <a:fontRef idx="minor">
+            <a:schemeClr val="lt1"/>
+          </a:fontRef>
+        </p:style>
+        <p:txBody>
+          <a:bodyPr rtlCol="0" anchor="ctr"/>
+          <a:lstStyle/>
+          <a:p>
+            <a:pPr algn="ctr"/>
+            <a:endParaRPr lang="de-DE"/>
+          </a:p>
+        </p:txBody>
+      </p:sp>
+      <p:pic>
+        <p:nvPicPr>
+          <p:cNvPr id="4098" name="Picture 2" descr="C:\Users\Tobi\Desktop\Daten\Studium\3Semester\PSE 2012\visual_cryptography\ShareKombo1.png"/>
+          <p:cNvPicPr>
+            <a:picLocks noChangeAspect="1" noChangeArrowheads="1"/>
+          </p:cNvPicPr>
+          <p:nvPr/>
+        </p:nvPicPr>
+        <p:blipFill>
+          <a:blip r:embed="rId3">
+            <a:extLst>
+              <a:ext uri="{28A0092B-C50C-407E-A947-70E740481C1C}">
+                <a14:useLocalDpi xmlns:a14="http://schemas.microsoft.com/office/drawing/2010/main" val="0"/>
+              </a:ext>
+            </a:extLst>
+          </a:blip>
+          <a:srcRect/>
+          <a:stretch>
+            <a:fillRect/>
+          </a:stretch>
+        </p:blipFill>
+        <p:spPr bwMode="auto">
+          <a:xfrm>
+            <a:off x="3581400" y="2838450"/>
+            <a:ext cx="1905000" cy="1428750"/>
+          </a:xfrm>
+          <a:prstGeom prst="rect">
+            <a:avLst/>
+          </a:prstGeom>
+          <a:noFill/>
+          <a:extLst>
+            <a:ext uri="{909E8E84-426E-40DD-AFC4-6F175D3DCCD1}">
+              <a14:hiddenFill xmlns:a14="http://schemas.microsoft.com/office/drawing/2010/main">
+                <a:solidFill>
+                  <a:srgbClr val="FFFFFF"/>
+                </a:solidFill>
+              </a14:hiddenFill>
+            </a:ext>
+          </a:extLst>
+        </p:spPr>
+      </p:pic>
+      <p:sp>
+        <p:nvSpPr>
+          <p:cNvPr id="14" name="Pfeil nach unten 13"/>
+          <p:cNvSpPr/>
+          <p:nvPr/>
+        </p:nvSpPr>
+        <p:spPr>
+          <a:xfrm rot="-3900000">
+            <a:off x="2972757" y="2631959"/>
+            <a:ext cx="361598" cy="568784"/>
+          </a:xfrm>
+          <a:prstGeom prst="downArrow">
+            <a:avLst>
+              <a:gd name="adj1" fmla="val 44533"/>
+              <a:gd name="adj2" fmla="val 50000"/>
+            </a:avLst>
+          </a:prstGeom>
+        </p:spPr>
+        <p:style>
+          <a:lnRef idx="2">
+            <a:schemeClr val="accent1">
+              <a:shade val="50000"/>
+            </a:schemeClr>
+          </a:lnRef>
+          <a:fillRef idx="1">
+            <a:schemeClr val="accent1"/>
+          </a:fillRef>
+          <a:effectRef idx="0">
+            <a:schemeClr val="accent1"/>
+          </a:effectRef>
+          <a:fontRef idx="minor">
+            <a:schemeClr val="lt1"/>
+          </a:fontRef>
+        </p:style>
+        <p:txBody>
+          <a:bodyPr rtlCol="0" anchor="ctr"/>
+          <a:lstStyle/>
+          <a:p>
+            <a:pPr algn="ctr"/>
+            <a:endParaRPr lang="de-DE"/>
+          </a:p>
+        </p:txBody>
+      </p:sp>
+      <p:pic>
+        <p:nvPicPr>
+          <p:cNvPr id="5122" name="Picture 2" descr="C:\Users\Tobi\Desktop\Daten\Studium\3Semester\PSE 2012\visual_cryptography\ShareKombo2.png"/>
+          <p:cNvPicPr>
+            <a:picLocks noChangeAspect="1" noChangeArrowheads="1"/>
+          </p:cNvPicPr>
+          <p:nvPr/>
+        </p:nvPicPr>
+        <p:blipFill>
+          <a:blip r:embed="rId4">
+            <a:extLst>
+              <a:ext uri="{28A0092B-C50C-407E-A947-70E740481C1C}">
+                <a14:useLocalDpi xmlns:a14="http://schemas.microsoft.com/office/drawing/2010/main" val="0"/>
+              </a:ext>
+            </a:extLst>
+          </a:blip>
+          <a:srcRect/>
+          <a:stretch>
+            <a:fillRect/>
+          </a:stretch>
+        </p:blipFill>
+        <p:spPr bwMode="auto">
+          <a:xfrm>
+            <a:off x="3581400" y="2838082"/>
+            <a:ext cx="1905000" cy="1428750"/>
+          </a:xfrm>
+          <a:prstGeom prst="rect">
+            <a:avLst/>
+          </a:prstGeom>
+          <a:noFill/>
+          <a:extLst>
+            <a:ext uri="{909E8E84-426E-40DD-AFC4-6F175D3DCCD1}">
+              <a14:hiddenFill xmlns:a14="http://schemas.microsoft.com/office/drawing/2010/main">
+                <a:solidFill>
+                  <a:srgbClr val="FFFFFF"/>
+                </a:solidFill>
+              </a14:hiddenFill>
+            </a:ext>
+          </a:extLst>
+        </p:spPr>
+      </p:pic>
+      <p:sp>
+        <p:nvSpPr>
+          <p:cNvPr id="15" name="Pfeil nach unten 14"/>
+          <p:cNvSpPr/>
+          <p:nvPr/>
+        </p:nvSpPr>
+        <p:spPr>
+          <a:xfrm rot="14700000">
+            <a:off x="2972757" y="3982807"/>
+            <a:ext cx="361598" cy="568784"/>
+          </a:xfrm>
+          <a:prstGeom prst="downArrow">
+            <a:avLst>
+              <a:gd name="adj1" fmla="val 44533"/>
+              <a:gd name="adj2" fmla="val 50000"/>
+            </a:avLst>
+          </a:prstGeom>
+        </p:spPr>
+        <p:style>
+          <a:lnRef idx="2">
+            <a:schemeClr val="accent1">
+              <a:shade val="50000"/>
+            </a:schemeClr>
+          </a:lnRef>
+          <a:fillRef idx="1">
+            <a:schemeClr val="accent1"/>
+          </a:fillRef>
+          <a:effectRef idx="0">
+            <a:schemeClr val="accent1"/>
+          </a:effectRef>
+          <a:fontRef idx="minor">
+            <a:schemeClr val="lt1"/>
+          </a:fontRef>
+        </p:style>
+        <p:txBody>
+          <a:bodyPr rtlCol="0" anchor="ctr"/>
+          <a:lstStyle/>
+          <a:p>
+            <a:pPr algn="ctr"/>
+            <a:endParaRPr lang="de-DE"/>
+          </a:p>
+        </p:txBody>
+      </p:sp>
+      <p:pic>
+        <p:nvPicPr>
+          <p:cNvPr id="6146" name="Picture 2" descr="C:\Users\Tobi\Desktop\Daten\Studium\3Semester\PSE 2012\visual_cryptography\ShareKombo3.png"/>
+          <p:cNvPicPr>
+            <a:picLocks noChangeAspect="1" noChangeArrowheads="1"/>
+          </p:cNvPicPr>
+          <p:nvPr/>
+        </p:nvPicPr>
+        <p:blipFill>
+          <a:blip r:embed="rId5">
+            <a:extLst>
+              <a:ext uri="{28A0092B-C50C-407E-A947-70E740481C1C}">
+                <a14:useLocalDpi xmlns:a14="http://schemas.microsoft.com/office/drawing/2010/main" val="0"/>
+              </a:ext>
+            </a:extLst>
+          </a:blip>
+          <a:srcRect/>
+          <a:stretch>
+            <a:fillRect/>
+          </a:stretch>
+        </p:blipFill>
+        <p:spPr bwMode="auto">
+          <a:xfrm>
+            <a:off x="3581400" y="2838082"/>
+            <a:ext cx="1905000" cy="1428750"/>
+          </a:xfrm>
+          <a:prstGeom prst="rect">
+            <a:avLst/>
+          </a:prstGeom>
+          <a:noFill/>
+          <a:extLst>
+            <a:ext uri="{909E8E84-426E-40DD-AFC4-6F175D3DCCD1}">
+              <a14:hiddenFill xmlns:a14="http://schemas.microsoft.com/office/drawing/2010/main">
+                <a:solidFill>
+                  <a:srgbClr val="FFFFFF"/>
+                </a:solidFill>
+              </a14:hiddenFill>
+            </a:ext>
+          </a:extLst>
+        </p:spPr>
+      </p:pic>
+      <p:sp>
+        <p:nvSpPr>
+          <p:cNvPr id="16" name="Pfeil nach unten 15"/>
+          <p:cNvSpPr/>
+          <p:nvPr/>
+        </p:nvSpPr>
+        <p:spPr>
+          <a:xfrm rot="7200000">
+            <a:off x="5677010" y="3982440"/>
+            <a:ext cx="361598" cy="568784"/>
+          </a:xfrm>
+          <a:prstGeom prst="downArrow">
+            <a:avLst>
+              <a:gd name="adj1" fmla="val 44533"/>
+              <a:gd name="adj2" fmla="val 50000"/>
+            </a:avLst>
+          </a:prstGeom>
+        </p:spPr>
+        <p:style>
+          <a:lnRef idx="2">
+            <a:schemeClr val="accent1">
+              <a:shade val="50000"/>
+            </a:schemeClr>
+          </a:lnRef>
+          <a:fillRef idx="1">
+            <a:schemeClr val="accent1"/>
+          </a:fillRef>
+          <a:effectRef idx="0">
+            <a:schemeClr val="accent1"/>
+          </a:effectRef>
+          <a:fontRef idx="minor">
+            <a:schemeClr val="lt1"/>
+          </a:fontRef>
+        </p:style>
+        <p:txBody>
+          <a:bodyPr rtlCol="0" anchor="ctr"/>
+          <a:lstStyle/>
+          <a:p>
+            <a:pPr algn="ctr"/>
+            <a:endParaRPr lang="de-DE"/>
+          </a:p>
+        </p:txBody>
+      </p:sp>
+      <p:sp>
+        <p:nvSpPr>
+          <p:cNvPr id="3" name="Textfeld 2"/>
+          <p:cNvSpPr txBox="1"/>
+          <p:nvPr/>
+        </p:nvSpPr>
+        <p:spPr>
+          <a:xfrm>
+            <a:off x="3581400" y="3276600"/>
+            <a:ext cx="1905000" cy="461665"/>
+          </a:xfrm>
+          <a:prstGeom prst="rect">
+            <a:avLst/>
+          </a:prstGeom>
+          <a:noFill/>
+        </p:spPr>
+        <p:txBody>
+          <a:bodyPr wrap="square" rtlCol="0">
+            <a:spAutoFit/>
+          </a:bodyPr>
+          <a:lstStyle/>
+          <a:p>
+            <a:pPr algn="ctr"/>
+            <a:r>
+              <a:rPr lang="de-DE" sz="2400" b="1" dirty="0" smtClean="0">
+                <a:effectLst>
+                  <a:outerShdw blurRad="38100" dist="38100" dir="2700000" algn="tl">
+                    <a:srgbClr val="000000">
+                      <a:alpha val="43137"/>
+                    </a:srgbClr>
+                  </a:outerShdw>
+                </a:effectLst>
+                <a:latin typeface="Dotum" pitchFamily="34" charset="-127"/>
+                <a:ea typeface="Dotum" pitchFamily="34" charset="-127"/>
+              </a:rPr>
+              <a:t>GEHEIMNIS</a:t>
+            </a:r>
+            <a:endParaRPr lang="de-DE" sz="2400" b="1" dirty="0">
+              <a:effectLst>
+                <a:outerShdw blurRad="38100" dist="38100" dir="2700000" algn="tl">
+                  <a:srgbClr val="000000">
+                    <a:alpha val="43137"/>
+                  </a:srgbClr>
+                </a:outerShdw>
+              </a:effectLst>
+              <a:latin typeface="Dotum" pitchFamily="34" charset="-127"/>
+              <a:ea typeface="Dotum" pitchFamily="34" charset="-127"/>
+            </a:endParaRPr>
+          </a:p>
+        </p:txBody>
+      </p:sp>
+    </p:spTree>
+    <p:extLst>
+      <p:ext uri="{BB962C8B-B14F-4D97-AF65-F5344CB8AC3E}">
+        <p14:creationId xmlns:p14="http://schemas.microsoft.com/office/powerpoint/2010/main" val="11191720"/>
+      </p:ext>
+    </p:extLst>
+  </p:cSld>
+  <p:clrMapOvr>
+    <a:masterClrMapping/>
+  </p:clrMapOvr>
+  <p:timing>
+    <p:tnLst>
+      <p:par>
+        <p:cTn id="1" dur="indefinite" restart="never" nodeType="tmRoot"/>
+      </p:par>
+    </p:tnLst>
+  </p:timing>
+</p:sld>
+</file>
+
+<file path=ppt/slides/slide19.xml><?xml version="1.0" encoding="utf-8"?>
 <p:sld xmlns:a="http://schemas.openxmlformats.org/drawingml/2006/main" xmlns:r="http://schemas.openxmlformats.org/officeDocument/2006/relationships" xmlns:p="http://schemas.openxmlformats.org/presentationml/2006/main">
   <p:cSld>
     <p:spTree>
@@ -9850,6 +12840,92 @@
           </a:p>
         </p:txBody>
       </p:sp>
+      <p:sp>
+        <p:nvSpPr>
+          <p:cNvPr id="17" name="Pfeil nach unten 16"/>
+          <p:cNvSpPr/>
+          <p:nvPr/>
+        </p:nvSpPr>
+        <p:spPr>
+          <a:xfrm rot="8100000">
+            <a:off x="2257601" y="1111348"/>
+            <a:ext cx="361598" cy="568784"/>
+          </a:xfrm>
+          <a:prstGeom prst="downArrow">
+            <a:avLst>
+              <a:gd name="adj1" fmla="val 44533"/>
+              <a:gd name="adj2" fmla="val 50000"/>
+            </a:avLst>
+          </a:prstGeom>
+        </p:spPr>
+        <p:style>
+          <a:lnRef idx="2">
+            <a:schemeClr val="accent1">
+              <a:shade val="50000"/>
+            </a:schemeClr>
+          </a:lnRef>
+          <a:fillRef idx="1">
+            <a:schemeClr val="accent1"/>
+          </a:fillRef>
+          <a:effectRef idx="0">
+            <a:schemeClr val="accent1"/>
+          </a:effectRef>
+          <a:fontRef idx="minor">
+            <a:schemeClr val="lt1"/>
+          </a:fontRef>
+        </p:style>
+        <p:txBody>
+          <a:bodyPr rtlCol="0" anchor="ctr"/>
+          <a:lstStyle/>
+          <a:p>
+            <a:pPr algn="ctr"/>
+            <a:endParaRPr lang="de-DE"/>
+          </a:p>
+        </p:txBody>
+      </p:sp>
+      <p:sp>
+        <p:nvSpPr>
+          <p:cNvPr id="18" name="Pfeil nach unten 17"/>
+          <p:cNvSpPr/>
+          <p:nvPr/>
+        </p:nvSpPr>
+        <p:spPr>
+          <a:xfrm rot="14700000">
+            <a:off x="1947508" y="1696808"/>
+            <a:ext cx="361598" cy="568784"/>
+          </a:xfrm>
+          <a:prstGeom prst="downArrow">
+            <a:avLst>
+              <a:gd name="adj1" fmla="val 44533"/>
+              <a:gd name="adj2" fmla="val 50000"/>
+            </a:avLst>
+          </a:prstGeom>
+        </p:spPr>
+        <p:style>
+          <a:lnRef idx="2">
+            <a:schemeClr val="accent1">
+              <a:shade val="50000"/>
+            </a:schemeClr>
+          </a:lnRef>
+          <a:fillRef idx="1">
+            <a:schemeClr val="accent1"/>
+          </a:fillRef>
+          <a:effectRef idx="0">
+            <a:schemeClr val="accent1"/>
+          </a:effectRef>
+          <a:fontRef idx="minor">
+            <a:schemeClr val="lt1"/>
+          </a:fontRef>
+        </p:style>
+        <p:txBody>
+          <a:bodyPr rtlCol="0" anchor="ctr"/>
+          <a:lstStyle/>
+          <a:p>
+            <a:pPr algn="ctr"/>
+            <a:endParaRPr lang="de-DE"/>
+          </a:p>
+        </p:txBody>
+      </p:sp>
     </p:spTree>
     <p:extLst>
       <p:ext uri="{BB962C8B-B14F-4D97-AF65-F5344CB8AC3E}">
@@ -9860,6 +12936,13 @@
   <p:clrMapOvr>
     <a:masterClrMapping/>
   </p:clrMapOvr>
+  <p:timing>
+    <p:tnLst>
+      <p:par>
+        <p:cTn id="1" dur="indefinite" restart="never" nodeType="tmRoot"/>
+      </p:par>
+    </p:tnLst>
+  </p:timing>
 </p:sld>
 </file>
 
@@ -9947,7 +13030,7 @@
   <p:timing>
     <p:tnLst>
       <p:par>
-        <p:cTn xmlns:p14="http://schemas.microsoft.com/office/powerpoint/2010/main" id="1" dur="indefinite" restart="never" nodeType="tmRoot"/>
+        <p:cTn id="1" dur="indefinite" restart="never" nodeType="tmRoot"/>
       </p:par>
     </p:tnLst>
   </p:timing>
@@ -10581,7 +13664,7 @@
   <p:timing>
     <p:tnLst>
       <p:par>
-        <p:cTn xmlns:p14="http://schemas.microsoft.com/office/powerpoint/2010/main" id="1" dur="indefinite" restart="never" nodeType="tmRoot"/>
+        <p:cTn id="1" dur="indefinite" restart="never" nodeType="tmRoot"/>
       </p:par>
     </p:tnLst>
   </p:timing>
@@ -10706,7 +13789,7 @@
   <p:timing>
     <p:tnLst>
       <p:par>
-        <p:cTn xmlns:p14="http://schemas.microsoft.com/office/powerpoint/2010/main" id="1" dur="indefinite" restart="never" nodeType="tmRoot"/>
+        <p:cTn id="1" dur="indefinite" restart="never" nodeType="tmRoot"/>
       </p:par>
     </p:tnLst>
   </p:timing>
@@ -10875,7 +13958,7 @@
   <p:timing>
     <p:tnLst>
       <p:par>
-        <p:cTn xmlns:p14="http://schemas.microsoft.com/office/powerpoint/2010/main" id="1" dur="indefinite" restart="never" nodeType="tmRoot"/>
+        <p:cTn id="1" dur="indefinite" restart="never" nodeType="tmRoot"/>
       </p:par>
     </p:tnLst>
   </p:timing>
@@ -11126,7 +14209,7 @@
   <p:timing>
     <p:tnLst>
       <p:par>
-        <p:cTn xmlns:p14="http://schemas.microsoft.com/office/powerpoint/2010/main" id="1" dur="indefinite" restart="never" nodeType="tmRoot"/>
+        <p:cTn id="1" dur="indefinite" restart="never" nodeType="tmRoot"/>
       </p:par>
     </p:tnLst>
   </p:timing>
@@ -11629,7 +14712,7 @@
   <p:timing>
     <p:tnLst>
       <p:par>
-        <p:cTn xmlns:p14="http://schemas.microsoft.com/office/powerpoint/2010/main" id="1" dur="indefinite" restart="never" nodeType="tmRoot"/>
+        <p:cTn id="1" dur="indefinite" restart="never" nodeType="tmRoot"/>
       </p:par>
     </p:tnLst>
   </p:timing>
@@ -12176,7 +15259,7 @@
   <p:timing>
     <p:tnLst>
       <p:par>
-        <p:cTn xmlns:p14="http://schemas.microsoft.com/office/powerpoint/2010/main" id="1" dur="indefinite" restart="never" nodeType="tmRoot"/>
+        <p:cTn id="1" dur="indefinite" restart="never" nodeType="tmRoot"/>
       </p:par>
     </p:tnLst>
   </p:timing>
@@ -12898,7 +15981,7 @@
   <p:timing>
     <p:tnLst>
       <p:par>
-        <p:cTn xmlns:p14="http://schemas.microsoft.com/office/powerpoint/2010/main" id="1" dur="indefinite" restart="never" nodeType="tmRoot"/>
+        <p:cTn id="1" dur="indefinite" restart="never" nodeType="tmRoot"/>
       </p:par>
     </p:tnLst>
   </p:timing>

</xml_diff>

<commit_message>
added idea to presentation
</commit_message>
<xml_diff>
--- a/praesentation/pse-abschluss.pptx
+++ b/praesentation/pse-abschluss.pptx
@@ -5,10 +5,10 @@
     <p:sldMasterId id="2147483676" r:id="rId1"/>
   </p:sldMasterIdLst>
   <p:notesMasterIdLst>
-    <p:notesMasterId r:id="rId21"/>
+    <p:notesMasterId r:id="rId22"/>
   </p:notesMasterIdLst>
   <p:handoutMasterIdLst>
-    <p:handoutMasterId r:id="rId22"/>
+    <p:handoutMasterId r:id="rId23"/>
   </p:handoutMasterIdLst>
   <p:sldIdLst>
     <p:sldId id="285" r:id="rId2"/>
@@ -29,7 +29,8 @@
     <p:sldId id="290" r:id="rId17"/>
     <p:sldId id="291" r:id="rId18"/>
     <p:sldId id="292" r:id="rId19"/>
-    <p:sldId id="270" r:id="rId20"/>
+    <p:sldId id="293" r:id="rId20"/>
+    <p:sldId id="270" r:id="rId21"/>
   </p:sldIdLst>
   <p:sldSz cx="9144000" cy="6858000" type="screen4x3"/>
   <p:notesSz cx="6858000" cy="9144000"/>
@@ -1833,19 +1834,19 @@
           <a:p>
             <a:r>
               <a:rPr lang="de-DE" dirty="0" smtClean="0"/>
-              <a:t>Entwurf</a:t>
-            </a:r>
-            <a:r>
-              <a:rPr lang="de-DE" smtClean="0"/>
-              <a:t>/Rohdaten</a:t>
-            </a:r>
-            <a:r>
-              <a:rPr lang="de-DE" baseline="0" smtClean="0"/>
-              <a:t> </a:t>
+              <a:t>Damit</a:t>
             </a:r>
             <a:r>
               <a:rPr lang="de-DE" baseline="0" dirty="0" smtClean="0"/>
-              <a:t>des Schlüssels</a:t>
+              <a:t> haben wir </a:t>
+            </a:r>
+            <a:r>
+              <a:rPr lang="de-DE" baseline="0" dirty="0" err="1" smtClean="0"/>
+              <a:t>broadcast</a:t>
+            </a:r>
+            <a:r>
+              <a:rPr lang="de-DE" baseline="0" dirty="0" smtClean="0"/>
+              <a:t> implementiert, unser Produkt…[nächste Folie]</a:t>
             </a:r>
             <a:endParaRPr lang="de-DE" dirty="0"/>
           </a:p>
@@ -1869,7 +1870,193 @@
             <a:fld id="{74ACB795-123D-4B41-ABB8-5412373C4490}" type="slidenum">
               <a:rPr lang="en-GB" smtClean="0"/>
               <a:pPr/>
+              <a:t>18</a:t>
+            </a:fld>
+            <a:endParaRPr lang="en-GB"/>
+          </a:p>
+        </p:txBody>
+      </p:sp>
+    </p:spTree>
+    <p:extLst>
+      <p:ext uri="{BB962C8B-B14F-4D97-AF65-F5344CB8AC3E}">
+        <p14:creationId xmlns:p14="http://schemas.microsoft.com/office/powerpoint/2010/main" val="4016535812"/>
+      </p:ext>
+    </p:extLst>
+  </p:cSld>
+  <p:clrMapOvr>
+    <a:masterClrMapping/>
+  </p:clrMapOvr>
+</p:notes>
+</file>
+
+<file path=ppt/notesSlides/notesSlide14.xml><?xml version="1.0" encoding="utf-8"?>
+<p:notes xmlns:a="http://schemas.openxmlformats.org/drawingml/2006/main" xmlns:r="http://schemas.openxmlformats.org/officeDocument/2006/relationships" xmlns:p="http://schemas.openxmlformats.org/presentationml/2006/main">
+  <p:cSld>
+    <p:spTree>
+      <p:nvGrpSpPr>
+        <p:cNvPr id="1" name=""/>
+        <p:cNvGrpSpPr/>
+        <p:nvPr/>
+      </p:nvGrpSpPr>
+      <p:grpSpPr>
+        <a:xfrm>
+          <a:off x="0" y="0"/>
+          <a:ext cx="0" cy="0"/>
+          <a:chOff x="0" y="0"/>
+          <a:chExt cx="0" cy="0"/>
+        </a:xfrm>
+      </p:grpSpPr>
+      <p:sp>
+        <p:nvSpPr>
+          <p:cNvPr id="2" name="Folienbildplatzhalter 1"/>
+          <p:cNvSpPr>
+            <a:spLocks noGrp="1" noRot="1" noChangeAspect="1"/>
+          </p:cNvSpPr>
+          <p:nvPr>
+            <p:ph type="sldImg"/>
+          </p:nvPr>
+        </p:nvSpPr>
+        <p:spPr/>
+      </p:sp>
+      <p:sp>
+        <p:nvSpPr>
+          <p:cNvPr id="3" name="Notizenplatzhalter 2"/>
+          <p:cNvSpPr>
+            <a:spLocks noGrp="1"/>
+          </p:cNvSpPr>
+          <p:nvPr>
+            <p:ph type="body" idx="1"/>
+          </p:nvPr>
+        </p:nvSpPr>
+        <p:spPr/>
+        <p:txBody>
+          <a:bodyPr/>
+          <a:lstStyle/>
+          <a:p>
+            <a:endParaRPr lang="de-DE" dirty="0"/>
+          </a:p>
+        </p:txBody>
+      </p:sp>
+      <p:sp>
+        <p:nvSpPr>
+          <p:cNvPr id="4" name="Foliennummernplatzhalter 3"/>
+          <p:cNvSpPr>
+            <a:spLocks noGrp="1"/>
+          </p:cNvSpPr>
+          <p:nvPr>
+            <p:ph type="sldNum" sz="quarter" idx="10"/>
+          </p:nvPr>
+        </p:nvSpPr>
+        <p:spPr/>
+        <p:txBody>
+          <a:bodyPr/>
+          <a:lstStyle/>
+          <a:p>
+            <a:fld id="{74ACB795-123D-4B41-ABB8-5412373C4490}" type="slidenum">
+              <a:rPr lang="en-GB" smtClean="0"/>
+              <a:pPr/>
               <a:t>19</a:t>
+            </a:fld>
+            <a:endParaRPr lang="en-GB"/>
+          </a:p>
+        </p:txBody>
+      </p:sp>
+    </p:spTree>
+    <p:extLst>
+      <p:ext uri="{BB962C8B-B14F-4D97-AF65-F5344CB8AC3E}">
+        <p14:creationId xmlns:p14="http://schemas.microsoft.com/office/powerpoint/2010/main" val="2223871487"/>
+      </p:ext>
+    </p:extLst>
+  </p:cSld>
+  <p:clrMapOvr>
+    <a:masterClrMapping/>
+  </p:clrMapOvr>
+</p:notes>
+</file>
+
+<file path=ppt/notesSlides/notesSlide15.xml><?xml version="1.0" encoding="utf-8"?>
+<p:notes xmlns:a="http://schemas.openxmlformats.org/drawingml/2006/main" xmlns:r="http://schemas.openxmlformats.org/officeDocument/2006/relationships" xmlns:p="http://schemas.openxmlformats.org/presentationml/2006/main">
+  <p:cSld>
+    <p:spTree>
+      <p:nvGrpSpPr>
+        <p:cNvPr id="1" name=""/>
+        <p:cNvGrpSpPr/>
+        <p:nvPr/>
+      </p:nvGrpSpPr>
+      <p:grpSpPr>
+        <a:xfrm>
+          <a:off x="0" y="0"/>
+          <a:ext cx="0" cy="0"/>
+          <a:chOff x="0" y="0"/>
+          <a:chExt cx="0" cy="0"/>
+        </a:xfrm>
+      </p:grpSpPr>
+      <p:sp>
+        <p:nvSpPr>
+          <p:cNvPr id="2" name="Folienbildplatzhalter 1"/>
+          <p:cNvSpPr>
+            <a:spLocks noGrp="1" noRot="1" noChangeAspect="1"/>
+          </p:cNvSpPr>
+          <p:nvPr>
+            <p:ph type="sldImg"/>
+          </p:nvPr>
+        </p:nvSpPr>
+        <p:spPr/>
+      </p:sp>
+      <p:sp>
+        <p:nvSpPr>
+          <p:cNvPr id="3" name="Notizenplatzhalter 2"/>
+          <p:cNvSpPr>
+            <a:spLocks noGrp="1"/>
+          </p:cNvSpPr>
+          <p:nvPr>
+            <p:ph type="body" idx="1"/>
+          </p:nvPr>
+        </p:nvSpPr>
+        <p:spPr/>
+        <p:txBody>
+          <a:bodyPr/>
+          <a:lstStyle/>
+          <a:p>
+            <a:r>
+              <a:rPr lang="de-DE" dirty="0" smtClean="0"/>
+              <a:t>Entwurf</a:t>
+            </a:r>
+            <a:r>
+              <a:rPr lang="de-DE" smtClean="0"/>
+              <a:t>/Rohdaten</a:t>
+            </a:r>
+            <a:r>
+              <a:rPr lang="de-DE" baseline="0" smtClean="0"/>
+              <a:t> </a:t>
+            </a:r>
+            <a:r>
+              <a:rPr lang="de-DE" baseline="0" dirty="0" smtClean="0"/>
+              <a:t>des Schlüssels</a:t>
+            </a:r>
+            <a:endParaRPr lang="de-DE" dirty="0"/>
+          </a:p>
+        </p:txBody>
+      </p:sp>
+      <p:sp>
+        <p:nvSpPr>
+          <p:cNvPr id="4" name="Foliennummernplatzhalter 3"/>
+          <p:cNvSpPr>
+            <a:spLocks noGrp="1"/>
+          </p:cNvSpPr>
+          <p:nvPr>
+            <p:ph type="sldNum" sz="quarter" idx="10"/>
+          </p:nvPr>
+        </p:nvSpPr>
+        <p:spPr/>
+        <p:txBody>
+          <a:bodyPr/>
+          <a:lstStyle/>
+          <a:p>
+            <a:fld id="{74ACB795-123D-4B41-ABB8-5412373C4490}" type="slidenum">
+              <a:rPr lang="en-GB" smtClean="0"/>
+              <a:pPr/>
+              <a:t>20</a:t>
             </a:fld>
             <a:endParaRPr lang="en-GB"/>
           </a:p>
@@ -5227,7 +5414,7 @@
               <a:pPr>
                 <a:defRPr/>
               </a:pPr>
-              <a:t>15.03.2013</a:t>
+              <a:t>16.03.2013</a:t>
             </a:fld>
             <a:endParaRPr lang="de-DE" sz="1000" dirty="0">
               <a:latin typeface="Arial" pitchFamily="34" charset="0"/>
@@ -11653,7 +11840,7 @@
           <p:nvPr/>
         </p:nvPicPr>
         <p:blipFill>
-          <a:blip r:embed="rId2">
+          <a:blip r:embed="rId3">
             <a:extLst>
               <a:ext uri="{28A0092B-C50C-407E-A947-70E740481C1C}">
                 <a14:useLocalDpi xmlns:a14="http://schemas.microsoft.com/office/drawing/2010/main" val="0"/>
@@ -11953,90 +12140,6 @@
       <p:pic>
         <p:nvPicPr>
           <p:cNvPr id="4098" name="Picture 2" descr="C:\Users\Tobi\Desktop\Daten\Studium\3Semester\PSE 2012\visual_cryptography\ShareKombo1.png"/>
-          <p:cNvPicPr>
-            <a:picLocks noChangeAspect="1" noChangeArrowheads="1"/>
-          </p:cNvPicPr>
-          <p:nvPr/>
-        </p:nvPicPr>
-        <p:blipFill>
-          <a:blip r:embed="rId3">
-            <a:extLst>
-              <a:ext uri="{28A0092B-C50C-407E-A947-70E740481C1C}">
-                <a14:useLocalDpi xmlns:a14="http://schemas.microsoft.com/office/drawing/2010/main" val="0"/>
-              </a:ext>
-            </a:extLst>
-          </a:blip>
-          <a:srcRect/>
-          <a:stretch>
-            <a:fillRect/>
-          </a:stretch>
-        </p:blipFill>
-        <p:spPr bwMode="auto">
-          <a:xfrm>
-            <a:off x="3581400" y="2838450"/>
-            <a:ext cx="1905000" cy="1428750"/>
-          </a:xfrm>
-          <a:prstGeom prst="rect">
-            <a:avLst/>
-          </a:prstGeom>
-          <a:noFill/>
-          <a:extLst>
-            <a:ext uri="{909E8E84-426E-40DD-AFC4-6F175D3DCCD1}">
-              <a14:hiddenFill xmlns:a14="http://schemas.microsoft.com/office/drawing/2010/main">
-                <a:solidFill>
-                  <a:srgbClr val="FFFFFF"/>
-                </a:solidFill>
-              </a14:hiddenFill>
-            </a:ext>
-          </a:extLst>
-        </p:spPr>
-      </p:pic>
-      <p:sp>
-        <p:nvSpPr>
-          <p:cNvPr id="14" name="Pfeil nach unten 13"/>
-          <p:cNvSpPr/>
-          <p:nvPr/>
-        </p:nvSpPr>
-        <p:spPr>
-          <a:xfrm rot="-3900000">
-            <a:off x="2972757" y="2631959"/>
-            <a:ext cx="361598" cy="568784"/>
-          </a:xfrm>
-          <a:prstGeom prst="downArrow">
-            <a:avLst>
-              <a:gd name="adj1" fmla="val 44533"/>
-              <a:gd name="adj2" fmla="val 50000"/>
-            </a:avLst>
-          </a:prstGeom>
-        </p:spPr>
-        <p:style>
-          <a:lnRef idx="2">
-            <a:schemeClr val="accent1">
-              <a:shade val="50000"/>
-            </a:schemeClr>
-          </a:lnRef>
-          <a:fillRef idx="1">
-            <a:schemeClr val="accent1"/>
-          </a:fillRef>
-          <a:effectRef idx="0">
-            <a:schemeClr val="accent1"/>
-          </a:effectRef>
-          <a:fontRef idx="minor">
-            <a:schemeClr val="lt1"/>
-          </a:fontRef>
-        </p:style>
-        <p:txBody>
-          <a:bodyPr rtlCol="0" anchor="ctr"/>
-          <a:lstStyle/>
-          <a:p>
-            <a:pPr algn="ctr"/>
-            <a:endParaRPr lang="de-DE"/>
-          </a:p>
-        </p:txBody>
-      </p:sp>
-      <p:pic>
-        <p:nvPicPr>
-          <p:cNvPr id="5122" name="Picture 2" descr="C:\Users\Tobi\Desktop\Daten\Studium\3Semester\PSE 2012\visual_cryptography\ShareKombo2.png"/>
           <p:cNvPicPr>
             <a:picLocks noChangeAspect="1" noChangeArrowheads="1"/>
           </p:cNvPicPr>
@@ -12057,7 +12160,7 @@
         </p:blipFill>
         <p:spPr bwMode="auto">
           <a:xfrm>
-            <a:off x="3581400" y="2838082"/>
+            <a:off x="3581400" y="2838450"/>
             <a:ext cx="1905000" cy="1428750"/>
           </a:xfrm>
           <a:prstGeom prst="rect">
@@ -12077,13 +12180,13 @@
       </p:pic>
       <p:sp>
         <p:nvSpPr>
-          <p:cNvPr id="15" name="Pfeil nach unten 14"/>
+          <p:cNvPr id="14" name="Pfeil nach unten 13"/>
           <p:cNvSpPr/>
           <p:nvPr/>
         </p:nvSpPr>
         <p:spPr>
-          <a:xfrm rot="14700000">
-            <a:off x="2972757" y="3982807"/>
+          <a:xfrm rot="-3900000">
+            <a:off x="2972757" y="2631959"/>
             <a:ext cx="361598" cy="568784"/>
           </a:xfrm>
           <a:prstGeom prst="downArrow">
@@ -12120,7 +12223,7 @@
       </p:sp>
       <p:pic>
         <p:nvPicPr>
-          <p:cNvPr id="6146" name="Picture 2" descr="C:\Users\Tobi\Desktop\Daten\Studium\3Semester\PSE 2012\visual_cryptography\ShareKombo3.png"/>
+          <p:cNvPr id="5122" name="Picture 2" descr="C:\Users\Tobi\Desktop\Daten\Studium\3Semester\PSE 2012\visual_cryptography\ShareKombo2.png"/>
           <p:cNvPicPr>
             <a:picLocks noChangeAspect="1" noChangeArrowheads="1"/>
           </p:cNvPicPr>
@@ -12161,6 +12264,90 @@
       </p:pic>
       <p:sp>
         <p:nvSpPr>
+          <p:cNvPr id="15" name="Pfeil nach unten 14"/>
+          <p:cNvSpPr/>
+          <p:nvPr/>
+        </p:nvSpPr>
+        <p:spPr>
+          <a:xfrm rot="14700000">
+            <a:off x="2972757" y="3982807"/>
+            <a:ext cx="361598" cy="568784"/>
+          </a:xfrm>
+          <a:prstGeom prst="downArrow">
+            <a:avLst>
+              <a:gd name="adj1" fmla="val 44533"/>
+              <a:gd name="adj2" fmla="val 50000"/>
+            </a:avLst>
+          </a:prstGeom>
+        </p:spPr>
+        <p:style>
+          <a:lnRef idx="2">
+            <a:schemeClr val="accent1">
+              <a:shade val="50000"/>
+            </a:schemeClr>
+          </a:lnRef>
+          <a:fillRef idx="1">
+            <a:schemeClr val="accent1"/>
+          </a:fillRef>
+          <a:effectRef idx="0">
+            <a:schemeClr val="accent1"/>
+          </a:effectRef>
+          <a:fontRef idx="minor">
+            <a:schemeClr val="lt1"/>
+          </a:fontRef>
+        </p:style>
+        <p:txBody>
+          <a:bodyPr rtlCol="0" anchor="ctr"/>
+          <a:lstStyle/>
+          <a:p>
+            <a:pPr algn="ctr"/>
+            <a:endParaRPr lang="de-DE"/>
+          </a:p>
+        </p:txBody>
+      </p:sp>
+      <p:pic>
+        <p:nvPicPr>
+          <p:cNvPr id="6146" name="Picture 2" descr="C:\Users\Tobi\Desktop\Daten\Studium\3Semester\PSE 2012\visual_cryptography\ShareKombo3.png"/>
+          <p:cNvPicPr>
+            <a:picLocks noChangeAspect="1" noChangeArrowheads="1"/>
+          </p:cNvPicPr>
+          <p:nvPr/>
+        </p:nvPicPr>
+        <p:blipFill>
+          <a:blip r:embed="rId6">
+            <a:extLst>
+              <a:ext uri="{28A0092B-C50C-407E-A947-70E740481C1C}">
+                <a14:useLocalDpi xmlns:a14="http://schemas.microsoft.com/office/drawing/2010/main" val="0"/>
+              </a:ext>
+            </a:extLst>
+          </a:blip>
+          <a:srcRect/>
+          <a:stretch>
+            <a:fillRect/>
+          </a:stretch>
+        </p:blipFill>
+        <p:spPr bwMode="auto">
+          <a:xfrm>
+            <a:off x="3581400" y="2838082"/>
+            <a:ext cx="1905000" cy="1428750"/>
+          </a:xfrm>
+          <a:prstGeom prst="rect">
+            <a:avLst/>
+          </a:prstGeom>
+          <a:noFill/>
+          <a:extLst>
+            <a:ext uri="{909E8E84-426E-40DD-AFC4-6F175D3DCCD1}">
+              <a14:hiddenFill xmlns:a14="http://schemas.microsoft.com/office/drawing/2010/main">
+                <a:solidFill>
+                  <a:srgbClr val="FFFFFF"/>
+                </a:solidFill>
+              </a14:hiddenFill>
+            </a:ext>
+          </a:extLst>
+        </p:spPr>
+      </p:pic>
+      <p:sp>
+        <p:nvSpPr>
           <p:cNvPr id="16" name="Pfeil nach unten 15"/>
           <p:cNvSpPr/>
           <p:nvPr/>
@@ -12274,6 +12461,229 @@
 </file>
 
 <file path=ppt/slides/slide19.xml><?xml version="1.0" encoding="utf-8"?>
+<p:sld xmlns:a="http://schemas.openxmlformats.org/drawingml/2006/main" xmlns:r="http://schemas.openxmlformats.org/officeDocument/2006/relationships" xmlns:p="http://schemas.openxmlformats.org/presentationml/2006/main">
+  <p:cSld>
+    <p:spTree>
+      <p:nvGrpSpPr>
+        <p:cNvPr id="1" name=""/>
+        <p:cNvGrpSpPr/>
+        <p:nvPr/>
+      </p:nvGrpSpPr>
+      <p:grpSpPr>
+        <a:xfrm>
+          <a:off x="0" y="0"/>
+          <a:ext cx="0" cy="0"/>
+          <a:chOff x="0" y="0"/>
+          <a:chExt cx="0" cy="0"/>
+        </a:xfrm>
+      </p:grpSpPr>
+      <p:sp>
+        <p:nvSpPr>
+          <p:cNvPr id="2" name="Titel 1"/>
+          <p:cNvSpPr>
+            <a:spLocks noGrp="1"/>
+          </p:cNvSpPr>
+          <p:nvPr>
+            <p:ph type="title"/>
+          </p:nvPr>
+        </p:nvSpPr>
+        <p:spPr/>
+        <p:txBody>
+          <a:bodyPr/>
+          <a:lstStyle/>
+          <a:p>
+            <a:r>
+              <a:rPr lang="de-DE" dirty="0" smtClean="0"/>
+              <a:t>Unser Produkt</a:t>
+            </a:r>
+            <a:endParaRPr lang="de-DE" dirty="0"/>
+          </a:p>
+        </p:txBody>
+      </p:sp>
+      <p:sp>
+        <p:nvSpPr>
+          <p:cNvPr id="3" name="Inhaltsplatzhalter 2"/>
+          <p:cNvSpPr>
+            <a:spLocks noGrp="1"/>
+          </p:cNvSpPr>
+          <p:nvPr>
+            <p:ph idx="1"/>
+          </p:nvPr>
+        </p:nvSpPr>
+        <p:spPr/>
+        <p:txBody>
+          <a:bodyPr/>
+          <a:lstStyle/>
+          <a:p>
+            <a:r>
+              <a:rPr lang="de-DE" dirty="0" smtClean="0"/>
+              <a:t>Beinhaltet Klient + Server + </a:t>
+            </a:r>
+            <a:r>
+              <a:rPr lang="de-DE" dirty="0" err="1" smtClean="0"/>
+              <a:t>Krypt</a:t>
+            </a:r>
+            <a:r>
+              <a:rPr lang="de-DE" dirty="0" smtClean="0"/>
+              <a:t>/</a:t>
+            </a:r>
+            <a:r>
+              <a:rPr lang="de-DE" dirty="0" err="1" smtClean="0"/>
+              <a:t>Kommu</a:t>
+            </a:r>
+            <a:endParaRPr lang="de-DE" dirty="0" smtClean="0"/>
+          </a:p>
+          <a:p>
+            <a:r>
+              <a:rPr lang="de-DE" dirty="0" smtClean="0"/>
+              <a:t>Besteht aus </a:t>
+            </a:r>
+            <a:r>
+              <a:rPr lang="de-DE" dirty="0" err="1" smtClean="0"/>
+              <a:t>LoC</a:t>
+            </a:r>
+            <a:r>
+              <a:rPr lang="de-DE" dirty="0" smtClean="0"/>
+              <a:t>, #Klassen usw..</a:t>
+            </a:r>
+          </a:p>
+          <a:p>
+            <a:r>
+              <a:rPr lang="de-DE" smtClean="0"/>
+              <a:t>TODO</a:t>
+            </a:r>
+            <a:endParaRPr lang="de-DE" dirty="0" smtClean="0"/>
+          </a:p>
+        </p:txBody>
+      </p:sp>
+      <p:sp>
+        <p:nvSpPr>
+          <p:cNvPr id="4" name="Fußzeilenplatzhalter 3"/>
+          <p:cNvSpPr>
+            <a:spLocks noGrp="1"/>
+          </p:cNvSpPr>
+          <p:nvPr>
+            <p:ph type="ftr" sz="quarter" idx="10"/>
+          </p:nvPr>
+        </p:nvSpPr>
+        <p:spPr/>
+        <p:txBody>
+          <a:bodyPr/>
+          <a:lstStyle/>
+          <a:p>
+            <a:r>
+              <a:rPr lang="de-DE" smtClean="0"/>
+              <a:t>Name Vorname: Titel des Vortrags</a:t>
+            </a:r>
+            <a:endParaRPr lang="de-DE"/>
+          </a:p>
+        </p:txBody>
+      </p:sp>
+    </p:spTree>
+    <p:extLst>
+      <p:ext uri="{BB962C8B-B14F-4D97-AF65-F5344CB8AC3E}">
+        <p14:creationId xmlns:p14="http://schemas.microsoft.com/office/powerpoint/2010/main" val="651171565"/>
+      </p:ext>
+    </p:extLst>
+  </p:cSld>
+  <p:clrMapOvr>
+    <a:masterClrMapping/>
+  </p:clrMapOvr>
+</p:sld>
+</file>
+
+<file path=ppt/slides/slide2.xml><?xml version="1.0" encoding="utf-8"?>
+<p:sld xmlns:a="http://schemas.openxmlformats.org/drawingml/2006/main" xmlns:r="http://schemas.openxmlformats.org/officeDocument/2006/relationships" xmlns:p="http://schemas.openxmlformats.org/presentationml/2006/main">
+  <p:cSld>
+    <p:spTree>
+      <p:nvGrpSpPr>
+        <p:cNvPr id="1" name=""/>
+        <p:cNvGrpSpPr/>
+        <p:nvPr/>
+      </p:nvGrpSpPr>
+      <p:grpSpPr>
+        <a:xfrm>
+          <a:off x="0" y="0"/>
+          <a:ext cx="0" cy="0"/>
+          <a:chOff x="0" y="0"/>
+          <a:chExt cx="0" cy="0"/>
+        </a:xfrm>
+      </p:grpSpPr>
+      <p:sp>
+        <p:nvSpPr>
+          <p:cNvPr id="4098" name="Rectangle 2"/>
+          <p:cNvSpPr>
+            <a:spLocks noGrp="1" noChangeArrowheads="1"/>
+          </p:cNvSpPr>
+          <p:nvPr>
+            <p:ph type="ctrTitle" idx="4294967295"/>
+          </p:nvPr>
+        </p:nvSpPr>
+        <p:spPr>
+          <a:xfrm>
+            <a:off x="381000" y="1701800"/>
+            <a:ext cx="8389937" cy="649287"/>
+          </a:xfrm>
+        </p:spPr>
+        <p:txBody>
+          <a:bodyPr/>
+          <a:lstStyle/>
+          <a:p>
+            <a:r>
+              <a:rPr lang="de-DE" sz="2200" noProof="0" dirty="0" smtClean="0"/>
+              <a:t>Broadcast Encryption</a:t>
+            </a:r>
+            <a:endParaRPr lang="de-DE" sz="2200" noProof="0" dirty="0"/>
+          </a:p>
+        </p:txBody>
+      </p:sp>
+      <p:sp>
+        <p:nvSpPr>
+          <p:cNvPr id="4099" name="Rectangle 3"/>
+          <p:cNvSpPr>
+            <a:spLocks noGrp="1" noChangeArrowheads="1"/>
+          </p:cNvSpPr>
+          <p:nvPr>
+            <p:ph type="subTitle" idx="4294967295"/>
+          </p:nvPr>
+        </p:nvSpPr>
+        <p:spPr>
+          <a:xfrm>
+            <a:off x="400050" y="2503487"/>
+            <a:ext cx="8370887" cy="620713"/>
+          </a:xfrm>
+        </p:spPr>
+        <p:txBody>
+          <a:bodyPr/>
+          <a:lstStyle/>
+          <a:p>
+            <a:pPr marL="0" indent="0">
+              <a:buNone/>
+            </a:pPr>
+            <a:r>
+              <a:rPr lang="de-DE" sz="1800" noProof="0" dirty="0" smtClean="0"/>
+              <a:t>TODO TITEL!</a:t>
+            </a:r>
+            <a:endParaRPr lang="de-DE" sz="1800" noProof="0" dirty="0"/>
+          </a:p>
+        </p:txBody>
+      </p:sp>
+    </p:spTree>
+  </p:cSld>
+  <p:clrMapOvr>
+    <a:masterClrMapping/>
+  </p:clrMapOvr>
+  <p:timing>
+    <p:tnLst>
+      <p:par>
+        <p:cTn id="1" dur="indefinite" restart="never" nodeType="tmRoot"/>
+      </p:par>
+    </p:tnLst>
+  </p:timing>
+</p:sld>
+</file>
+
+<file path=ppt/slides/slide20.xml><?xml version="1.0" encoding="utf-8"?>
 <p:sld xmlns:a="http://schemas.openxmlformats.org/drawingml/2006/main" xmlns:r="http://schemas.openxmlformats.org/officeDocument/2006/relationships" xmlns:p="http://schemas.openxmlformats.org/presentationml/2006/main">
   <p:cSld>
     <p:spTree>
@@ -12932,97 +13342,6 @@
         <p14:creationId xmlns:p14="http://schemas.microsoft.com/office/powerpoint/2010/main" val="2404995977"/>
       </p:ext>
     </p:extLst>
-  </p:cSld>
-  <p:clrMapOvr>
-    <a:masterClrMapping/>
-  </p:clrMapOvr>
-  <p:timing>
-    <p:tnLst>
-      <p:par>
-        <p:cTn id="1" dur="indefinite" restart="never" nodeType="tmRoot"/>
-      </p:par>
-    </p:tnLst>
-  </p:timing>
-</p:sld>
-</file>
-
-<file path=ppt/slides/slide2.xml><?xml version="1.0" encoding="utf-8"?>
-<p:sld xmlns:a="http://schemas.openxmlformats.org/drawingml/2006/main" xmlns:r="http://schemas.openxmlformats.org/officeDocument/2006/relationships" xmlns:p="http://schemas.openxmlformats.org/presentationml/2006/main">
-  <p:cSld>
-    <p:spTree>
-      <p:nvGrpSpPr>
-        <p:cNvPr id="1" name=""/>
-        <p:cNvGrpSpPr/>
-        <p:nvPr/>
-      </p:nvGrpSpPr>
-      <p:grpSpPr>
-        <a:xfrm>
-          <a:off x="0" y="0"/>
-          <a:ext cx="0" cy="0"/>
-          <a:chOff x="0" y="0"/>
-          <a:chExt cx="0" cy="0"/>
-        </a:xfrm>
-      </p:grpSpPr>
-      <p:sp>
-        <p:nvSpPr>
-          <p:cNvPr id="4098" name="Rectangle 2"/>
-          <p:cNvSpPr>
-            <a:spLocks noGrp="1" noChangeArrowheads="1"/>
-          </p:cNvSpPr>
-          <p:nvPr>
-            <p:ph type="ctrTitle" idx="4294967295"/>
-          </p:nvPr>
-        </p:nvSpPr>
-        <p:spPr>
-          <a:xfrm>
-            <a:off x="381000" y="1701800"/>
-            <a:ext cx="8389937" cy="649287"/>
-          </a:xfrm>
-        </p:spPr>
-        <p:txBody>
-          <a:bodyPr/>
-          <a:lstStyle/>
-          <a:p>
-            <a:r>
-              <a:rPr lang="de-DE" sz="2200" noProof="0" dirty="0" smtClean="0"/>
-              <a:t>Broadcast Encryption</a:t>
-            </a:r>
-            <a:endParaRPr lang="de-DE" sz="2200" noProof="0" dirty="0"/>
-          </a:p>
-        </p:txBody>
-      </p:sp>
-      <p:sp>
-        <p:nvSpPr>
-          <p:cNvPr id="4099" name="Rectangle 3"/>
-          <p:cNvSpPr>
-            <a:spLocks noGrp="1" noChangeArrowheads="1"/>
-          </p:cNvSpPr>
-          <p:nvPr>
-            <p:ph type="subTitle" idx="4294967295"/>
-          </p:nvPr>
-        </p:nvSpPr>
-        <p:spPr>
-          <a:xfrm>
-            <a:off x="400050" y="2503487"/>
-            <a:ext cx="8370887" cy="620713"/>
-          </a:xfrm>
-        </p:spPr>
-        <p:txBody>
-          <a:bodyPr/>
-          <a:lstStyle/>
-          <a:p>
-            <a:pPr marL="0" indent="0">
-              <a:buNone/>
-            </a:pPr>
-            <a:r>
-              <a:rPr lang="de-DE" sz="1800" noProof="0" dirty="0" smtClean="0"/>
-              <a:t>TODO TITEL!</a:t>
-            </a:r>
-            <a:endParaRPr lang="de-DE" sz="1800" noProof="0" dirty="0"/>
-          </a:p>
-        </p:txBody>
-      </p:sp>
-    </p:spTree>
   </p:cSld>
   <p:clrMapOvr>
     <a:masterClrMapping/>

</xml_diff>